<commit_message>
Update User Guide and images
</commit_message>
<xml_diff>
--- a/docs/diagrams/ModelComponentClassDiagram.pptx
+++ b/docs/diagrams/ModelComponentClassDiagram.pptx
@@ -208,7 +208,7 @@
           <a:p>
             <a:fld id="{F5CC4B3F-88C1-4FFA-B1B6-F41C21DC6924}" type="datetimeFigureOut">
               <a:rPr lang="en-US" smtClean="0"/>
-              <a:t>1/1/18</a:t>
+              <a:t>4/5/2018</a:t>
             </a:fld>
             <a:endParaRPr lang="en-US"/>
           </a:p>
@@ -272,38 +272,37 @@
           <a:p>
             <a:pPr lvl="0"/>
             <a:r>
-              <a:rPr lang="en-US" smtClean="0"/>
+              <a:rPr lang="en-US"/>
               <a:t>Click to edit Master text styles</a:t>
             </a:r>
           </a:p>
           <a:p>
             <a:pPr lvl="1"/>
             <a:r>
-              <a:rPr lang="en-US" smtClean="0"/>
+              <a:rPr lang="en-US"/>
               <a:t>Second level</a:t>
             </a:r>
           </a:p>
           <a:p>
             <a:pPr lvl="2"/>
             <a:r>
-              <a:rPr lang="en-US" smtClean="0"/>
+              <a:rPr lang="en-US"/>
               <a:t>Third level</a:t>
             </a:r>
           </a:p>
           <a:p>
             <a:pPr lvl="3"/>
             <a:r>
-              <a:rPr lang="en-US" smtClean="0"/>
+              <a:rPr lang="en-US"/>
               <a:t>Fourth level</a:t>
             </a:r>
           </a:p>
           <a:p>
             <a:pPr lvl="4"/>
             <a:r>
-              <a:rPr lang="en-US" smtClean="0"/>
+              <a:rPr lang="en-US"/>
               <a:t>Fifth level</a:t>
             </a:r>
-            <a:endParaRPr lang="en-US"/>
           </a:p>
         </p:txBody>
       </p:sp>
@@ -514,10 +513,9 @@
           <a:lstStyle/>
           <a:p>
             <a:r>
-              <a:rPr lang="en-US" smtClean="0"/>
+              <a:rPr lang="en-US"/>
               <a:t>Click to edit Master title style</a:t>
             </a:r>
-            <a:endParaRPr lang="en-US"/>
           </a:p>
         </p:txBody>
       </p:sp>
@@ -633,10 +631,9 @@
           </a:lstStyle>
           <a:p>
             <a:r>
-              <a:rPr lang="en-US" smtClean="0"/>
+              <a:rPr lang="en-US"/>
               <a:t>Click to edit Master subtitle style</a:t>
             </a:r>
-            <a:endParaRPr lang="en-US"/>
           </a:p>
         </p:txBody>
       </p:sp>
@@ -657,7 +654,7 @@
           <a:p>
             <a:fld id="{78C97017-6FC3-485B-9764-EAC9E56C1D49}" type="datetimeFigureOut">
               <a:rPr lang="en-US" smtClean="0"/>
-              <a:t>1/1/18</a:t>
+              <a:t>4/5/2018</a:t>
             </a:fld>
             <a:endParaRPr lang="en-US"/>
           </a:p>
@@ -751,10 +748,9 @@
           <a:lstStyle/>
           <a:p>
             <a:r>
-              <a:rPr lang="en-US" smtClean="0"/>
+              <a:rPr lang="en-US"/>
               <a:t>Click to edit Master title style</a:t>
             </a:r>
-            <a:endParaRPr lang="en-US"/>
           </a:p>
         </p:txBody>
       </p:sp>
@@ -775,38 +771,37 @@
           <a:p>
             <a:pPr lvl="0"/>
             <a:r>
-              <a:rPr lang="en-US" smtClean="0"/>
+              <a:rPr lang="en-US"/>
               <a:t>Click to edit Master text styles</a:t>
             </a:r>
           </a:p>
           <a:p>
             <a:pPr lvl="1"/>
             <a:r>
-              <a:rPr lang="en-US" smtClean="0"/>
+              <a:rPr lang="en-US"/>
               <a:t>Second level</a:t>
             </a:r>
           </a:p>
           <a:p>
             <a:pPr lvl="2"/>
             <a:r>
-              <a:rPr lang="en-US" smtClean="0"/>
+              <a:rPr lang="en-US"/>
               <a:t>Third level</a:t>
             </a:r>
           </a:p>
           <a:p>
             <a:pPr lvl="3"/>
             <a:r>
-              <a:rPr lang="en-US" smtClean="0"/>
+              <a:rPr lang="en-US"/>
               <a:t>Fourth level</a:t>
             </a:r>
           </a:p>
           <a:p>
             <a:pPr lvl="4"/>
             <a:r>
-              <a:rPr lang="en-US" smtClean="0"/>
+              <a:rPr lang="en-US"/>
               <a:t>Fifth level</a:t>
             </a:r>
-            <a:endParaRPr lang="en-US"/>
           </a:p>
         </p:txBody>
       </p:sp>
@@ -827,7 +822,7 @@
           <a:p>
             <a:fld id="{78C97017-6FC3-485B-9764-EAC9E56C1D49}" type="datetimeFigureOut">
               <a:rPr lang="en-US" smtClean="0"/>
-              <a:t>1/1/18</a:t>
+              <a:t>4/5/2018</a:t>
             </a:fld>
             <a:endParaRPr lang="en-US"/>
           </a:p>
@@ -926,10 +921,9 @@
           <a:lstStyle/>
           <a:p>
             <a:r>
-              <a:rPr lang="en-US" smtClean="0"/>
+              <a:rPr lang="en-US"/>
               <a:t>Click to edit Master title style</a:t>
             </a:r>
-            <a:endParaRPr lang="en-US"/>
           </a:p>
         </p:txBody>
       </p:sp>
@@ -955,38 +949,37 @@
           <a:p>
             <a:pPr lvl="0"/>
             <a:r>
-              <a:rPr lang="en-US" smtClean="0"/>
+              <a:rPr lang="en-US"/>
               <a:t>Click to edit Master text styles</a:t>
             </a:r>
           </a:p>
           <a:p>
             <a:pPr lvl="1"/>
             <a:r>
-              <a:rPr lang="en-US" smtClean="0"/>
+              <a:rPr lang="en-US"/>
               <a:t>Second level</a:t>
             </a:r>
           </a:p>
           <a:p>
             <a:pPr lvl="2"/>
             <a:r>
-              <a:rPr lang="en-US" smtClean="0"/>
+              <a:rPr lang="en-US"/>
               <a:t>Third level</a:t>
             </a:r>
           </a:p>
           <a:p>
             <a:pPr lvl="3"/>
             <a:r>
-              <a:rPr lang="en-US" smtClean="0"/>
+              <a:rPr lang="en-US"/>
               <a:t>Fourth level</a:t>
             </a:r>
           </a:p>
           <a:p>
             <a:pPr lvl="4"/>
             <a:r>
-              <a:rPr lang="en-US" smtClean="0"/>
+              <a:rPr lang="en-US"/>
               <a:t>Fifth level</a:t>
             </a:r>
-            <a:endParaRPr lang="en-US"/>
           </a:p>
         </p:txBody>
       </p:sp>
@@ -1007,7 +1000,7 @@
           <a:p>
             <a:fld id="{78C97017-6FC3-485B-9764-EAC9E56C1D49}" type="datetimeFigureOut">
               <a:rPr lang="en-US" smtClean="0"/>
-              <a:t>1/1/18</a:t>
+              <a:t>4/5/2018</a:t>
             </a:fld>
             <a:endParaRPr lang="en-US"/>
           </a:p>
@@ -1101,10 +1094,9 @@
           <a:lstStyle/>
           <a:p>
             <a:r>
-              <a:rPr lang="en-US" smtClean="0"/>
+              <a:rPr lang="en-US"/>
               <a:t>Click to edit Master title style</a:t>
             </a:r>
-            <a:endParaRPr lang="en-US"/>
           </a:p>
         </p:txBody>
       </p:sp>
@@ -1125,38 +1117,37 @@
           <a:p>
             <a:pPr lvl="0"/>
             <a:r>
-              <a:rPr lang="en-US" smtClean="0"/>
+              <a:rPr lang="en-US"/>
               <a:t>Click to edit Master text styles</a:t>
             </a:r>
           </a:p>
           <a:p>
             <a:pPr lvl="1"/>
             <a:r>
-              <a:rPr lang="en-US" smtClean="0"/>
+              <a:rPr lang="en-US"/>
               <a:t>Second level</a:t>
             </a:r>
           </a:p>
           <a:p>
             <a:pPr lvl="2"/>
             <a:r>
-              <a:rPr lang="en-US" smtClean="0"/>
+              <a:rPr lang="en-US"/>
               <a:t>Third level</a:t>
             </a:r>
           </a:p>
           <a:p>
             <a:pPr lvl="3"/>
             <a:r>
-              <a:rPr lang="en-US" smtClean="0"/>
+              <a:rPr lang="en-US"/>
               <a:t>Fourth level</a:t>
             </a:r>
           </a:p>
           <a:p>
             <a:pPr lvl="4"/>
             <a:r>
-              <a:rPr lang="en-US" smtClean="0"/>
+              <a:rPr lang="en-US"/>
               <a:t>Fifth level</a:t>
             </a:r>
-            <a:endParaRPr lang="en-US"/>
           </a:p>
         </p:txBody>
       </p:sp>
@@ -1177,7 +1168,7 @@
           <a:p>
             <a:fld id="{78C97017-6FC3-485B-9764-EAC9E56C1D49}" type="datetimeFigureOut">
               <a:rPr lang="en-US" smtClean="0"/>
-              <a:t>1/1/18</a:t>
+              <a:t>4/5/2018</a:t>
             </a:fld>
             <a:endParaRPr lang="en-US"/>
           </a:p>
@@ -1280,10 +1271,9 @@
           </a:lstStyle>
           <a:p>
             <a:r>
-              <a:rPr lang="en-US" smtClean="0"/>
+              <a:rPr lang="en-US"/>
               <a:t>Click to edit Master title style</a:t>
             </a:r>
-            <a:endParaRPr lang="en-US"/>
           </a:p>
         </p:txBody>
       </p:sp>
@@ -1400,7 +1390,7 @@
           <a:p>
             <a:pPr lvl="0"/>
             <a:r>
-              <a:rPr lang="en-US" smtClean="0"/>
+              <a:rPr lang="en-US"/>
               <a:t>Click to edit Master text styles</a:t>
             </a:r>
           </a:p>
@@ -1423,7 +1413,7 @@
           <a:p>
             <a:fld id="{78C97017-6FC3-485B-9764-EAC9E56C1D49}" type="datetimeFigureOut">
               <a:rPr lang="en-US" smtClean="0"/>
-              <a:t>1/1/18</a:t>
+              <a:t>4/5/2018</a:t>
             </a:fld>
             <a:endParaRPr lang="en-US"/>
           </a:p>
@@ -1517,10 +1507,9 @@
           <a:lstStyle/>
           <a:p>
             <a:r>
-              <a:rPr lang="en-US" smtClean="0"/>
+              <a:rPr lang="en-US"/>
               <a:t>Click to edit Master title style</a:t>
             </a:r>
-            <a:endParaRPr lang="en-US"/>
           </a:p>
         </p:txBody>
       </p:sp>
@@ -1574,38 +1563,37 @@
           <a:p>
             <a:pPr lvl="0"/>
             <a:r>
-              <a:rPr lang="en-US" smtClean="0"/>
+              <a:rPr lang="en-US"/>
               <a:t>Click to edit Master text styles</a:t>
             </a:r>
           </a:p>
           <a:p>
             <a:pPr lvl="1"/>
             <a:r>
-              <a:rPr lang="en-US" smtClean="0"/>
+              <a:rPr lang="en-US"/>
               <a:t>Second level</a:t>
             </a:r>
           </a:p>
           <a:p>
             <a:pPr lvl="2"/>
             <a:r>
-              <a:rPr lang="en-US" smtClean="0"/>
+              <a:rPr lang="en-US"/>
               <a:t>Third level</a:t>
             </a:r>
           </a:p>
           <a:p>
             <a:pPr lvl="3"/>
             <a:r>
-              <a:rPr lang="en-US" smtClean="0"/>
+              <a:rPr lang="en-US"/>
               <a:t>Fourth level</a:t>
             </a:r>
           </a:p>
           <a:p>
             <a:pPr lvl="4"/>
             <a:r>
-              <a:rPr lang="en-US" smtClean="0"/>
+              <a:rPr lang="en-US"/>
               <a:t>Fifth level</a:t>
             </a:r>
-            <a:endParaRPr lang="en-US"/>
           </a:p>
         </p:txBody>
       </p:sp>
@@ -1659,38 +1647,37 @@
           <a:p>
             <a:pPr lvl="0"/>
             <a:r>
-              <a:rPr lang="en-US" smtClean="0"/>
+              <a:rPr lang="en-US"/>
               <a:t>Click to edit Master text styles</a:t>
             </a:r>
           </a:p>
           <a:p>
             <a:pPr lvl="1"/>
             <a:r>
-              <a:rPr lang="en-US" smtClean="0"/>
+              <a:rPr lang="en-US"/>
               <a:t>Second level</a:t>
             </a:r>
           </a:p>
           <a:p>
             <a:pPr lvl="2"/>
             <a:r>
-              <a:rPr lang="en-US" smtClean="0"/>
+              <a:rPr lang="en-US"/>
               <a:t>Third level</a:t>
             </a:r>
           </a:p>
           <a:p>
             <a:pPr lvl="3"/>
             <a:r>
-              <a:rPr lang="en-US" smtClean="0"/>
+              <a:rPr lang="en-US"/>
               <a:t>Fourth level</a:t>
             </a:r>
           </a:p>
           <a:p>
             <a:pPr lvl="4"/>
             <a:r>
-              <a:rPr lang="en-US" smtClean="0"/>
+              <a:rPr lang="en-US"/>
               <a:t>Fifth level</a:t>
             </a:r>
-            <a:endParaRPr lang="en-US"/>
           </a:p>
         </p:txBody>
       </p:sp>
@@ -1711,7 +1698,7 @@
           <a:p>
             <a:fld id="{78C97017-6FC3-485B-9764-EAC9E56C1D49}" type="datetimeFigureOut">
               <a:rPr lang="en-US" smtClean="0"/>
-              <a:t>1/1/18</a:t>
+              <a:t>4/5/2018</a:t>
             </a:fld>
             <a:endParaRPr lang="en-US"/>
           </a:p>
@@ -1809,10 +1796,9 @@
           </a:lstStyle>
           <a:p>
             <a:r>
-              <a:rPr lang="en-US" smtClean="0"/>
+              <a:rPr lang="en-US"/>
               <a:t>Click to edit Master title style</a:t>
             </a:r>
-            <a:endParaRPr lang="en-US"/>
           </a:p>
         </p:txBody>
       </p:sp>
@@ -1875,7 +1861,7 @@
           <a:p>
             <a:pPr lvl="0"/>
             <a:r>
-              <a:rPr lang="en-US" smtClean="0"/>
+              <a:rPr lang="en-US"/>
               <a:t>Click to edit Master text styles</a:t>
             </a:r>
           </a:p>
@@ -1931,38 +1917,37 @@
           <a:p>
             <a:pPr lvl="0"/>
             <a:r>
-              <a:rPr lang="en-US" smtClean="0"/>
+              <a:rPr lang="en-US"/>
               <a:t>Click to edit Master text styles</a:t>
             </a:r>
           </a:p>
           <a:p>
             <a:pPr lvl="1"/>
             <a:r>
-              <a:rPr lang="en-US" smtClean="0"/>
+              <a:rPr lang="en-US"/>
               <a:t>Second level</a:t>
             </a:r>
           </a:p>
           <a:p>
             <a:pPr lvl="2"/>
             <a:r>
-              <a:rPr lang="en-US" smtClean="0"/>
+              <a:rPr lang="en-US"/>
               <a:t>Third level</a:t>
             </a:r>
           </a:p>
           <a:p>
             <a:pPr lvl="3"/>
             <a:r>
-              <a:rPr lang="en-US" smtClean="0"/>
+              <a:rPr lang="en-US"/>
               <a:t>Fourth level</a:t>
             </a:r>
           </a:p>
           <a:p>
             <a:pPr lvl="4"/>
             <a:r>
-              <a:rPr lang="en-US" smtClean="0"/>
+              <a:rPr lang="en-US"/>
               <a:t>Fifth level</a:t>
             </a:r>
-            <a:endParaRPr lang="en-US"/>
           </a:p>
         </p:txBody>
       </p:sp>
@@ -2025,7 +2010,7 @@
           <a:p>
             <a:pPr lvl="0"/>
             <a:r>
-              <a:rPr lang="en-US" smtClean="0"/>
+              <a:rPr lang="en-US"/>
               <a:t>Click to edit Master text styles</a:t>
             </a:r>
           </a:p>
@@ -2081,38 +2066,37 @@
           <a:p>
             <a:pPr lvl="0"/>
             <a:r>
-              <a:rPr lang="en-US" smtClean="0"/>
+              <a:rPr lang="en-US"/>
               <a:t>Click to edit Master text styles</a:t>
             </a:r>
           </a:p>
           <a:p>
             <a:pPr lvl="1"/>
             <a:r>
-              <a:rPr lang="en-US" smtClean="0"/>
+              <a:rPr lang="en-US"/>
               <a:t>Second level</a:t>
             </a:r>
           </a:p>
           <a:p>
             <a:pPr lvl="2"/>
             <a:r>
-              <a:rPr lang="en-US" smtClean="0"/>
+              <a:rPr lang="en-US"/>
               <a:t>Third level</a:t>
             </a:r>
           </a:p>
           <a:p>
             <a:pPr lvl="3"/>
             <a:r>
-              <a:rPr lang="en-US" smtClean="0"/>
+              <a:rPr lang="en-US"/>
               <a:t>Fourth level</a:t>
             </a:r>
           </a:p>
           <a:p>
             <a:pPr lvl="4"/>
             <a:r>
-              <a:rPr lang="en-US" smtClean="0"/>
+              <a:rPr lang="en-US"/>
               <a:t>Fifth level</a:t>
             </a:r>
-            <a:endParaRPr lang="en-US"/>
           </a:p>
         </p:txBody>
       </p:sp>
@@ -2133,7 +2117,7 @@
           <a:p>
             <a:fld id="{78C97017-6FC3-485B-9764-EAC9E56C1D49}" type="datetimeFigureOut">
               <a:rPr lang="en-US" smtClean="0"/>
-              <a:t>1/1/18</a:t>
+              <a:t>4/5/2018</a:t>
             </a:fld>
             <a:endParaRPr lang="en-US"/>
           </a:p>
@@ -2227,10 +2211,9 @@
           <a:lstStyle/>
           <a:p>
             <a:r>
-              <a:rPr lang="en-US" smtClean="0"/>
+              <a:rPr lang="en-US"/>
               <a:t>Click to edit Master title style</a:t>
             </a:r>
-            <a:endParaRPr lang="en-US"/>
           </a:p>
         </p:txBody>
       </p:sp>
@@ -2251,7 +2234,7 @@
           <a:p>
             <a:fld id="{78C97017-6FC3-485B-9764-EAC9E56C1D49}" type="datetimeFigureOut">
               <a:rPr lang="en-US" smtClean="0"/>
-              <a:t>1/1/18</a:t>
+              <a:t>4/5/2018</a:t>
             </a:fld>
             <a:endParaRPr lang="en-US"/>
           </a:p>
@@ -2346,7 +2329,7 @@
           <a:p>
             <a:fld id="{78C97017-6FC3-485B-9764-EAC9E56C1D49}" type="datetimeFigureOut">
               <a:rPr lang="en-US" smtClean="0"/>
-              <a:t>1/1/18</a:t>
+              <a:t>4/5/2018</a:t>
             </a:fld>
             <a:endParaRPr lang="en-US"/>
           </a:p>
@@ -2449,10 +2432,9 @@
           </a:lstStyle>
           <a:p>
             <a:r>
-              <a:rPr lang="en-US" smtClean="0"/>
+              <a:rPr lang="en-US"/>
               <a:t>Click to edit Master title style</a:t>
             </a:r>
-            <a:endParaRPr lang="en-US"/>
           </a:p>
         </p:txBody>
       </p:sp>
@@ -2506,38 +2488,37 @@
           <a:p>
             <a:pPr lvl="0"/>
             <a:r>
-              <a:rPr lang="en-US" smtClean="0"/>
+              <a:rPr lang="en-US"/>
               <a:t>Click to edit Master text styles</a:t>
             </a:r>
           </a:p>
           <a:p>
             <a:pPr lvl="1"/>
             <a:r>
-              <a:rPr lang="en-US" smtClean="0"/>
+              <a:rPr lang="en-US"/>
               <a:t>Second level</a:t>
             </a:r>
           </a:p>
           <a:p>
             <a:pPr lvl="2"/>
             <a:r>
-              <a:rPr lang="en-US" smtClean="0"/>
+              <a:rPr lang="en-US"/>
               <a:t>Third level</a:t>
             </a:r>
           </a:p>
           <a:p>
             <a:pPr lvl="3"/>
             <a:r>
-              <a:rPr lang="en-US" smtClean="0"/>
+              <a:rPr lang="en-US"/>
               <a:t>Fourth level</a:t>
             </a:r>
           </a:p>
           <a:p>
             <a:pPr lvl="4"/>
             <a:r>
-              <a:rPr lang="en-US" smtClean="0"/>
+              <a:rPr lang="en-US"/>
               <a:t>Fifth level</a:t>
             </a:r>
-            <a:endParaRPr lang="en-US"/>
           </a:p>
         </p:txBody>
       </p:sp>
@@ -2600,7 +2581,7 @@
           <a:p>
             <a:pPr lvl="0"/>
             <a:r>
-              <a:rPr lang="en-US" smtClean="0"/>
+              <a:rPr lang="en-US"/>
               <a:t>Click to edit Master text styles</a:t>
             </a:r>
           </a:p>
@@ -2623,7 +2604,7 @@
           <a:p>
             <a:fld id="{78C97017-6FC3-485B-9764-EAC9E56C1D49}" type="datetimeFigureOut">
               <a:rPr lang="en-US" smtClean="0"/>
-              <a:t>1/1/18</a:t>
+              <a:t>4/5/2018</a:t>
             </a:fld>
             <a:endParaRPr lang="en-US"/>
           </a:p>
@@ -2726,10 +2707,9 @@
           </a:lstStyle>
           <a:p>
             <a:r>
-              <a:rPr lang="en-US" smtClean="0"/>
+              <a:rPr lang="en-US"/>
               <a:t>Click to edit Master title style</a:t>
             </a:r>
-            <a:endParaRPr lang="en-US"/>
           </a:p>
         </p:txBody>
       </p:sp>
@@ -2853,7 +2833,7 @@
           <a:p>
             <a:pPr lvl="0"/>
             <a:r>
-              <a:rPr lang="en-US" smtClean="0"/>
+              <a:rPr lang="en-US"/>
               <a:t>Click to edit Master text styles</a:t>
             </a:r>
           </a:p>
@@ -2876,7 +2856,7 @@
           <a:p>
             <a:fld id="{78C97017-6FC3-485B-9764-EAC9E56C1D49}" type="datetimeFigureOut">
               <a:rPr lang="en-US" smtClean="0"/>
-              <a:t>1/1/18</a:t>
+              <a:t>4/5/2018</a:t>
             </a:fld>
             <a:endParaRPr lang="en-US"/>
           </a:p>
@@ -2985,10 +2965,9 @@
           <a:lstStyle/>
           <a:p>
             <a:r>
-              <a:rPr lang="en-US" smtClean="0"/>
+              <a:rPr lang="en-US"/>
               <a:t>Click to edit Master title style</a:t>
             </a:r>
-            <a:endParaRPr lang="en-US"/>
           </a:p>
         </p:txBody>
       </p:sp>
@@ -3019,38 +2998,37 @@
           <a:p>
             <a:pPr lvl="0"/>
             <a:r>
-              <a:rPr lang="en-US" smtClean="0"/>
+              <a:rPr lang="en-US"/>
               <a:t>Click to edit Master text styles</a:t>
             </a:r>
           </a:p>
           <a:p>
             <a:pPr lvl="1"/>
             <a:r>
-              <a:rPr lang="en-US" smtClean="0"/>
+              <a:rPr lang="en-US"/>
               <a:t>Second level</a:t>
             </a:r>
           </a:p>
           <a:p>
             <a:pPr lvl="2"/>
             <a:r>
-              <a:rPr lang="en-US" smtClean="0"/>
+              <a:rPr lang="en-US"/>
               <a:t>Third level</a:t>
             </a:r>
           </a:p>
           <a:p>
             <a:pPr lvl="3"/>
             <a:r>
-              <a:rPr lang="en-US" smtClean="0"/>
+              <a:rPr lang="en-US"/>
               <a:t>Fourth level</a:t>
             </a:r>
           </a:p>
           <a:p>
             <a:pPr lvl="4"/>
             <a:r>
-              <a:rPr lang="en-US" smtClean="0"/>
+              <a:rPr lang="en-US"/>
               <a:t>Fifth level</a:t>
             </a:r>
-            <a:endParaRPr lang="en-US"/>
           </a:p>
         </p:txBody>
       </p:sp>
@@ -3089,7 +3067,7 @@
           <a:p>
             <a:fld id="{78C97017-6FC3-485B-9764-EAC9E56C1D49}" type="datetimeFigureOut">
               <a:rPr lang="en-US" smtClean="0"/>
-              <a:t>1/1/18</a:t>
+              <a:t>4/5/2018</a:t>
             </a:fld>
             <a:endParaRPr lang="en-US"/>
           </a:p>
@@ -3510,7 +3488,7 @@
           <a:lstStyle/>
           <a:p>
             <a:r>
-              <a:rPr lang="en-US" sz="1200" b="1" dirty="0" smtClean="0">
+              <a:rPr lang="en-US" sz="1200" b="1" dirty="0">
                 <a:solidFill>
                   <a:srgbClr val="7030A0"/>
                 </a:solidFill>
@@ -3569,7 +3547,7 @@
           <a:p>
             <a:pPr algn="ctr"/>
             <a:r>
-              <a:rPr lang="en-US" sz="1050" dirty="0" err="1" smtClean="0">
+              <a:rPr lang="en-US" sz="1050" dirty="0" err="1">
                 <a:solidFill>
                   <a:schemeClr val="bg1"/>
                 </a:solidFill>
@@ -3628,7 +3606,7 @@
           <a:p>
             <a:pPr algn="ctr"/>
             <a:r>
-              <a:rPr lang="en-US" sz="1050" dirty="0" err="1" smtClean="0">
+              <a:rPr lang="en-US" sz="1050" dirty="0" err="1">
                 <a:solidFill>
                   <a:schemeClr val="bg1"/>
                 </a:solidFill>
@@ -3742,7 +3720,7 @@
           <a:p>
             <a:pPr algn="ctr"/>
             <a:r>
-              <a:rPr lang="en-US" sz="1050" dirty="0" smtClean="0">
+              <a:rPr lang="en-US" sz="1050" dirty="0">
                 <a:solidFill>
                   <a:schemeClr val="bg1"/>
                 </a:solidFill>
@@ -4015,12 +3993,12 @@
           <a:p>
             <a:pPr algn="ctr"/>
             <a:r>
-              <a:rPr lang="en-US" sz="1050" dirty="0" err="1" smtClean="0">
+              <a:rPr lang="en-US" sz="1050" dirty="0" err="1">
                 <a:solidFill>
                   <a:srgbClr val="7030A0"/>
                 </a:solidFill>
               </a:rPr>
-              <a:t>AddressBook</a:t>
+              <a:t>Investigapptor</a:t>
             </a:r>
             <a:endParaRPr lang="en-SG" sz="1050" dirty="0">
               <a:solidFill>
@@ -4157,7 +4135,7 @@
           <a:p>
             <a:pPr algn="ctr"/>
             <a:r>
-              <a:rPr lang="en-US" sz="1050" dirty="0" err="1" smtClean="0">
+              <a:rPr lang="en-US" sz="1050" dirty="0" err="1">
                 <a:solidFill>
                   <a:srgbClr val="7030A0"/>
                 </a:solidFill>
@@ -4301,7 +4279,7 @@
           <a:p>
             <a:pPr algn="ctr"/>
             <a:r>
-              <a:rPr lang="en-US" sz="1050" dirty="0" err="1" smtClean="0">
+              <a:rPr lang="en-US" sz="1050" dirty="0" err="1">
                 <a:solidFill>
                   <a:srgbClr val="7030A0"/>
                 </a:solidFill>
@@ -4400,7 +4378,7 @@
           <a:p>
             <a:pPr algn="ctr"/>
             <a:r>
-              <a:rPr lang="en-US" sz="1050" dirty="0" smtClean="0">
+              <a:rPr lang="en-US" sz="1050" dirty="0">
                 <a:solidFill>
                   <a:srgbClr val="7030A0"/>
                 </a:solidFill>
@@ -4464,6 +4442,7 @@
         <p:nvCxnSpPr>
           <p:cNvPr id="64" name="Elbow Connector 63"/>
           <p:cNvCxnSpPr>
+            <a:cxnSpLocks/>
             <a:stCxn id="63" idx="3"/>
             <a:endCxn id="62" idx="1"/>
           </p:cNvCxnSpPr>
@@ -4542,7 +4521,7 @@
           <a:p>
             <a:pPr algn="ctr"/>
             <a:r>
-              <a:rPr lang="en-US" sz="1050" dirty="0" smtClean="0">
+              <a:rPr lang="en-US" sz="1050" dirty="0">
                 <a:solidFill>
                   <a:srgbClr val="7030A0"/>
                 </a:solidFill>
@@ -4651,7 +4630,7 @@
         </p:nvSpPr>
         <p:spPr>
           <a:xfrm>
-            <a:off x="7712397" y="2564238"/>
+            <a:off x="7670414" y="1805384"/>
             <a:ext cx="708186" cy="285783"/>
           </a:xfrm>
           <a:prstGeom prst="rect">
@@ -4684,7 +4663,7 @@
           <a:p>
             <a:pPr algn="ctr"/>
             <a:r>
-              <a:rPr lang="en-US" sz="1050" dirty="0" smtClean="0">
+              <a:rPr lang="en-US" sz="1050" dirty="0">
                 <a:solidFill>
                   <a:srgbClr val="7030A0"/>
                 </a:solidFill>
@@ -4707,8 +4686,8 @@
         </p:nvSpPr>
         <p:spPr>
           <a:xfrm>
-            <a:off x="7041947" y="2948201"/>
-            <a:ext cx="236048" cy="173380"/>
+            <a:off x="6800956" y="2627329"/>
+            <a:ext cx="154284" cy="220042"/>
           </a:xfrm>
           <a:prstGeom prst="flowChartDecision">
             <a:avLst/>
@@ -4750,17 +4729,18 @@
         <p:nvCxnSpPr>
           <p:cNvPr id="79" name="Elbow Connector 78"/>
           <p:cNvCxnSpPr>
-            <a:stCxn id="78" idx="3"/>
+            <a:cxnSpLocks/>
+            <a:stCxn id="78" idx="0"/>
             <a:endCxn id="76" idx="1"/>
           </p:cNvCxnSpPr>
           <p:nvPr/>
         </p:nvCxnSpPr>
         <p:spPr>
-          <a:xfrm flipV="1">
-            <a:off x="7277995" y="2707130"/>
-            <a:ext cx="434402" cy="327761"/>
-          </a:xfrm>
-          <a:prstGeom prst="bentConnector3">
+          <a:xfrm rot="5400000" flipH="1" flipV="1">
+            <a:off x="6934730" y="1891645"/>
+            <a:ext cx="679053" cy="792316"/>
+          </a:xfrm>
+          <a:prstGeom prst="bentConnector2">
             <a:avLst/>
           </a:prstGeom>
           <a:ln w="19050">
@@ -4795,7 +4775,7 @@
         </p:nvSpPr>
         <p:spPr>
           <a:xfrm>
-            <a:off x="7712397" y="2887216"/>
+            <a:off x="7670414" y="2128362"/>
             <a:ext cx="708186" cy="285783"/>
           </a:xfrm>
           <a:prstGeom prst="rect">
@@ -4828,7 +4808,7 @@
           <a:p>
             <a:pPr algn="ctr"/>
             <a:r>
-              <a:rPr lang="en-US" sz="1050" dirty="0" smtClean="0">
+              <a:rPr lang="en-US" sz="1050" dirty="0">
                 <a:solidFill>
                   <a:srgbClr val="7030A0"/>
                 </a:solidFill>
@@ -4847,17 +4827,18 @@
         <p:nvCxnSpPr>
           <p:cNvPr id="81" name="Elbow Connector 80"/>
           <p:cNvCxnSpPr>
-            <a:stCxn id="78" idx="3"/>
+            <a:cxnSpLocks/>
+            <a:stCxn id="78" idx="0"/>
             <a:endCxn id="80" idx="1"/>
           </p:cNvCxnSpPr>
           <p:nvPr/>
         </p:nvCxnSpPr>
         <p:spPr>
-          <a:xfrm flipV="1">
-            <a:off x="7277995" y="3030108"/>
-            <a:ext cx="434402" cy="4783"/>
-          </a:xfrm>
-          <a:prstGeom prst="bentConnector3">
+          <a:xfrm rot="5400000" flipH="1" flipV="1">
+            <a:off x="7096219" y="2053134"/>
+            <a:ext cx="356075" cy="792316"/>
+          </a:xfrm>
+          <a:prstGeom prst="bentConnector2">
             <a:avLst/>
           </a:prstGeom>
           <a:ln w="19050">
@@ -4892,7 +4873,7 @@
         </p:nvSpPr>
         <p:spPr>
           <a:xfrm>
-            <a:off x="7712397" y="3210194"/>
+            <a:off x="7670414" y="2451340"/>
             <a:ext cx="708186" cy="285783"/>
           </a:xfrm>
           <a:prstGeom prst="rect">
@@ -4925,7 +4906,7 @@
           <a:p>
             <a:pPr algn="ctr"/>
             <a:r>
-              <a:rPr lang="en-US" sz="1050" dirty="0" smtClean="0">
+              <a:rPr lang="en-US" sz="1050" dirty="0">
                 <a:solidFill>
                   <a:srgbClr val="7030A0"/>
                 </a:solidFill>
@@ -4944,18 +4925,20 @@
         <p:nvCxnSpPr>
           <p:cNvPr id="84" name="Elbow Connector 83"/>
           <p:cNvCxnSpPr>
-            <a:stCxn id="78" idx="3"/>
+            <a:cxnSpLocks/>
             <a:endCxn id="83" idx="1"/>
           </p:cNvCxnSpPr>
           <p:nvPr/>
         </p:nvCxnSpPr>
         <p:spPr>
           <a:xfrm>
-            <a:off x="7277995" y="3034891"/>
-            <a:ext cx="434402" cy="318195"/>
+            <a:off x="6877547" y="2397597"/>
+            <a:ext cx="792867" cy="196635"/>
           </a:xfrm>
           <a:prstGeom prst="bentConnector3">
-            <a:avLst/>
+            <a:avLst>
+              <a:gd name="adj1" fmla="val 50000"/>
+            </a:avLst>
           </a:prstGeom>
           <a:ln w="19050">
             <a:solidFill>
@@ -4989,7 +4972,7 @@
         </p:nvSpPr>
         <p:spPr>
           <a:xfrm>
-            <a:off x="7712397" y="3533171"/>
+            <a:off x="7670414" y="2774317"/>
             <a:ext cx="708186" cy="285783"/>
           </a:xfrm>
           <a:prstGeom prst="rect">
@@ -5022,7 +5005,7 @@
           <a:p>
             <a:pPr algn="ctr"/>
             <a:r>
-              <a:rPr lang="en-US" sz="1050" dirty="0" smtClean="0">
+              <a:rPr lang="en-US" sz="1050" dirty="0">
                 <a:solidFill>
                   <a:srgbClr val="7030A0"/>
                 </a:solidFill>
@@ -5041,18 +5024,22 @@
         <p:nvCxnSpPr>
           <p:cNvPr id="86" name="Elbow Connector 85"/>
           <p:cNvCxnSpPr>
-            <a:stCxn id="78" idx="3"/>
+            <a:cxnSpLocks/>
+            <a:stCxn id="78" idx="0"/>
             <a:endCxn id="85" idx="1"/>
           </p:cNvCxnSpPr>
           <p:nvPr/>
         </p:nvCxnSpPr>
         <p:spPr>
-          <a:xfrm>
-            <a:off x="7277995" y="3034891"/>
-            <a:ext cx="434402" cy="641172"/>
-          </a:xfrm>
-          <a:prstGeom prst="bentConnector3">
-            <a:avLst/>
+          <a:xfrm rot="16200000" flipH="1">
+            <a:off x="7129316" y="2376111"/>
+            <a:ext cx="289880" cy="792316"/>
+          </a:xfrm>
+          <a:prstGeom prst="bentConnector4">
+            <a:avLst>
+              <a:gd name="adj1" fmla="val -78860"/>
+              <a:gd name="adj2" fmla="val 49739"/>
+            </a:avLst>
           </a:prstGeom>
           <a:ln w="19050">
             <a:solidFill>
@@ -5210,7 +5197,7 @@
           <a:p>
             <a:pPr algn="ctr"/>
             <a:r>
-              <a:rPr lang="en-US" sz="1050" dirty="0" smtClean="0">
+              <a:rPr lang="en-US" sz="1050" dirty="0">
                 <a:solidFill>
                   <a:srgbClr val="7030A0"/>
                 </a:solidFill>
@@ -5218,19 +5205,19 @@
               <a:t>&lt;&lt;interface&gt;&gt;</a:t>
             </a:r>
             <a:br>
-              <a:rPr lang="en-US" sz="1050" dirty="0" smtClean="0">
+              <a:rPr lang="en-US" sz="1050" dirty="0">
                 <a:solidFill>
                   <a:srgbClr val="7030A0"/>
                 </a:solidFill>
               </a:rPr>
             </a:br>
             <a:r>
-              <a:rPr lang="en-US" sz="1050" dirty="0" err="1" smtClean="0">
+              <a:rPr lang="en-US" sz="1050" dirty="0" err="1">
                 <a:solidFill>
                   <a:srgbClr val="7030A0"/>
                 </a:solidFill>
               </a:rPr>
-              <a:t>ReadOnlyAddressBook</a:t>
+              <a:t>ReadOnlyInvestigapptor</a:t>
             </a:r>
             <a:endParaRPr lang="en-SG" sz="1050" dirty="0">
               <a:solidFill>
@@ -5247,8 +5234,8 @@
           <p:nvPr/>
         </p:nvSpPr>
         <p:spPr>
-          <a:xfrm rot="16200000">
-            <a:off x="6527512" y="3586305"/>
+          <a:xfrm>
+            <a:off x="5819805" y="3739875"/>
             <a:ext cx="881018" cy="261610"/>
           </a:xfrm>
           <a:prstGeom prst="rect">
@@ -5264,7 +5251,7 @@
           <a:p>
             <a:pPr algn="r"/>
             <a:r>
-              <a:rPr lang="en-US" sz="1100" dirty="0" smtClean="0">
+              <a:rPr lang="en-US" sz="1100" dirty="0">
                 <a:solidFill>
                   <a:srgbClr val="7030A0"/>
                 </a:solidFill>
@@ -5320,20 +5307,12 @@
           <a:p>
             <a:pPr algn="ctr"/>
             <a:r>
-              <a:rPr lang="en-US" sz="1050" dirty="0" smtClean="0">
+              <a:rPr lang="en-US" sz="1050" dirty="0">
                 <a:solidFill>
                   <a:srgbClr val="7030A0"/>
                 </a:solidFill>
               </a:rPr>
               <a:t>&lt;&lt;interface&gt;&gt;</a:t>
-            </a:r>
-            <a:r>
-              <a:rPr lang="en-US" sz="1050">
-                <a:solidFill>
-                  <a:srgbClr val="7030A0"/>
-                </a:solidFill>
-              </a:rPr>
-              <a:t/>
             </a:r>
             <a:br>
               <a:rPr lang="en-US" sz="1050">
@@ -5343,7 +5322,7 @@
               </a:rPr>
             </a:br>
             <a:r>
-              <a:rPr lang="en-US" sz="1050" dirty="0" err="1" smtClean="0">
+              <a:rPr lang="en-US" sz="1050" dirty="0" err="1">
                 <a:solidFill>
                   <a:srgbClr val="7030A0"/>
                 </a:solidFill>
@@ -5465,7 +5444,7 @@
           <a:p>
             <a:pPr algn="ctr"/>
             <a:r>
-              <a:rPr lang="en-US" sz="1100" dirty="0" smtClean="0">
+              <a:rPr lang="en-US" sz="1100" dirty="0">
                 <a:solidFill>
                   <a:srgbClr val="7030A0"/>
                 </a:solidFill>
@@ -5504,7 +5483,7 @@
           <a:p>
             <a:pPr algn="ctr"/>
             <a:r>
-              <a:rPr lang="en-US" sz="1100" dirty="0" smtClean="0">
+              <a:rPr lang="en-US" sz="1100" dirty="0">
                 <a:solidFill>
                   <a:srgbClr val="7030A0"/>
                 </a:solidFill>
@@ -5543,7 +5522,7 @@
           <a:p>
             <a:pPr algn="ctr"/>
             <a:r>
-              <a:rPr lang="en-US" sz="1100" dirty="0" smtClean="0">
+              <a:rPr lang="en-US" sz="1100" dirty="0">
                 <a:solidFill>
                   <a:srgbClr val="7030A0"/>
                 </a:solidFill>
@@ -5582,7 +5561,7 @@
           <a:p>
             <a:pPr algn="ctr"/>
             <a:r>
-              <a:rPr lang="en-US" sz="1100" dirty="0" smtClean="0">
+              <a:rPr lang="en-US" sz="1100" dirty="0">
                 <a:solidFill>
                   <a:srgbClr val="7030A0"/>
                 </a:solidFill>
@@ -5621,7 +5600,7 @@
           <a:p>
             <a:pPr algn="ctr"/>
             <a:r>
-              <a:rPr lang="en-US" sz="1100" dirty="0" smtClean="0">
+              <a:rPr lang="en-US" sz="1100" dirty="0">
                 <a:solidFill>
                   <a:srgbClr val="7030A0"/>
                 </a:solidFill>
@@ -5660,7 +5639,7 @@
           <a:p>
             <a:pPr algn="ctr"/>
             <a:r>
-              <a:rPr lang="en-US" sz="1100" dirty="0" smtClean="0">
+              <a:rPr lang="en-US" sz="1100" dirty="0">
                 <a:solidFill>
                   <a:srgbClr val="7030A0"/>
                 </a:solidFill>
@@ -5699,7 +5678,7 @@
           <a:p>
             <a:pPr algn="ctr"/>
             <a:r>
-              <a:rPr lang="en-US" sz="1100" dirty="0" smtClean="0">
+              <a:rPr lang="en-US" sz="1100" dirty="0">
                 <a:solidFill>
                   <a:srgbClr val="7030A0"/>
                 </a:solidFill>
@@ -5738,7 +5717,7 @@
           <a:p>
             <a:pPr algn="ctr"/>
             <a:r>
-              <a:rPr lang="en-US" sz="1100" dirty="0" smtClean="0">
+              <a:rPr lang="en-US" sz="1100" dirty="0">
                 <a:solidFill>
                   <a:srgbClr val="7030A0"/>
                 </a:solidFill>
@@ -5753,6 +5732,916 @@
           </a:p>
         </p:txBody>
       </p:sp>
+      <p:sp>
+        <p:nvSpPr>
+          <p:cNvPr id="52" name="Rectangle 8">
+            <a:extLst>
+              <a:ext uri="{FF2B5EF4-FFF2-40B4-BE49-F238E27FC236}">
+                <a16:creationId xmlns:a16="http://schemas.microsoft.com/office/drawing/2014/main" id="{D5F8307B-1F01-43A1-8E75-45DC8DBEE3F6}"/>
+              </a:ext>
+            </a:extLst>
+          </p:cNvPr>
+          <p:cNvSpPr/>
+          <p:nvPr/>
+        </p:nvSpPr>
+        <p:spPr>
+          <a:xfrm>
+            <a:off x="4477328" y="3318608"/>
+            <a:ext cx="1332788" cy="346760"/>
+          </a:xfrm>
+          <a:prstGeom prst="rect">
+            <a:avLst/>
+          </a:prstGeom>
+          <a:ln w="19050">
+            <a:solidFill>
+              <a:srgbClr val="7030A0"/>
+            </a:solidFill>
+          </a:ln>
+          <a:effectLst/>
+        </p:spPr>
+        <p:style>
+          <a:lnRef idx="1">
+            <a:schemeClr val="accent4"/>
+          </a:lnRef>
+          <a:fillRef idx="2">
+            <a:schemeClr val="accent4"/>
+          </a:fillRef>
+          <a:effectRef idx="1">
+            <a:schemeClr val="accent4"/>
+          </a:effectRef>
+          <a:fontRef idx="minor">
+            <a:schemeClr val="dk1"/>
+          </a:fontRef>
+        </p:style>
+        <p:txBody>
+          <a:bodyPr rtlCol="0" anchor="ctr"/>
+          <a:lstStyle/>
+          <a:p>
+            <a:pPr algn="ctr"/>
+            <a:r>
+              <a:rPr lang="en-US" sz="1050" dirty="0" err="1">
+                <a:solidFill>
+                  <a:srgbClr val="7030A0"/>
+                </a:solidFill>
+              </a:rPr>
+              <a:t>UniqueCrimeCaseList</a:t>
+            </a:r>
+            <a:endParaRPr lang="en-SG" sz="1050" dirty="0">
+              <a:solidFill>
+                <a:srgbClr val="7030A0"/>
+              </a:solidFill>
+            </a:endParaRPr>
+          </a:p>
+        </p:txBody>
+      </p:sp>
+      <p:cxnSp>
+        <p:nvCxnSpPr>
+          <p:cNvPr id="55" name="Elbow Connector 29">
+            <a:extLst>
+              <a:ext uri="{FF2B5EF4-FFF2-40B4-BE49-F238E27FC236}">
+                <a16:creationId xmlns:a16="http://schemas.microsoft.com/office/drawing/2014/main" id="{FE7938E7-8A28-4D21-9AF6-7F17DDF96164}"/>
+              </a:ext>
+            </a:extLst>
+          </p:cNvPr>
+          <p:cNvCxnSpPr>
+            <a:cxnSpLocks/>
+            <a:endCxn id="52" idx="1"/>
+          </p:cNvCxnSpPr>
+          <p:nvPr/>
+        </p:nvCxnSpPr>
+        <p:spPr>
+          <a:xfrm rot="16200000" flipH="1">
+            <a:off x="4060064" y="3074724"/>
+            <a:ext cx="710010" cy="124517"/>
+          </a:xfrm>
+          <a:prstGeom prst="bentConnector2">
+            <a:avLst/>
+          </a:prstGeom>
+          <a:ln w="19050">
+            <a:solidFill>
+              <a:srgbClr val="7030A0"/>
+            </a:solidFill>
+            <a:headEnd type="none" w="med" len="med"/>
+            <a:tailEnd type="arrow" w="med" len="med"/>
+          </a:ln>
+          <a:effectLst/>
+        </p:spPr>
+        <p:style>
+          <a:lnRef idx="1">
+            <a:schemeClr val="accent2"/>
+          </a:lnRef>
+          <a:fillRef idx="2">
+            <a:schemeClr val="accent2"/>
+          </a:fillRef>
+          <a:effectRef idx="1">
+            <a:schemeClr val="accent2"/>
+          </a:effectRef>
+          <a:fontRef idx="minor">
+            <a:schemeClr val="dk1"/>
+          </a:fontRef>
+        </p:style>
+      </p:cxnSp>
+      <p:sp>
+        <p:nvSpPr>
+          <p:cNvPr id="71" name="TextBox 70">
+            <a:extLst>
+              <a:ext uri="{FF2B5EF4-FFF2-40B4-BE49-F238E27FC236}">
+                <a16:creationId xmlns:a16="http://schemas.microsoft.com/office/drawing/2014/main" id="{7DE9B9EC-3CD8-456B-BC32-EB14C9A4F97C}"/>
+              </a:ext>
+            </a:extLst>
+          </p:cNvPr>
+          <p:cNvSpPr txBox="1"/>
+          <p:nvPr/>
+        </p:nvSpPr>
+        <p:spPr>
+          <a:xfrm>
+            <a:off x="4228877" y="3497379"/>
+            <a:ext cx="189257" cy="178683"/>
+          </a:xfrm>
+          <a:prstGeom prst="rect">
+            <a:avLst/>
+          </a:prstGeom>
+          <a:noFill/>
+        </p:spPr>
+        <p:txBody>
+          <a:bodyPr wrap="square" lIns="0" tIns="0" rIns="0" bIns="0" rtlCol="0">
+            <a:noAutofit/>
+          </a:bodyPr>
+          <a:lstStyle/>
+          <a:p>
+            <a:pPr algn="ctr"/>
+            <a:r>
+              <a:rPr lang="en-US" sz="1100" dirty="0">
+                <a:solidFill>
+                  <a:srgbClr val="7030A0"/>
+                </a:solidFill>
+              </a:rPr>
+              <a:t>1</a:t>
+            </a:r>
+            <a:endParaRPr lang="en-SG" sz="1100" dirty="0">
+              <a:solidFill>
+                <a:srgbClr val="7030A0"/>
+              </a:solidFill>
+            </a:endParaRPr>
+          </a:p>
+        </p:txBody>
+      </p:sp>
+      <p:sp>
+        <p:nvSpPr>
+          <p:cNvPr id="82" name="Rectangle 8">
+            <a:extLst>
+              <a:ext uri="{FF2B5EF4-FFF2-40B4-BE49-F238E27FC236}">
+                <a16:creationId xmlns:a16="http://schemas.microsoft.com/office/drawing/2014/main" id="{34109FE0-0CEE-439D-90A8-5D3C0F8C4786}"/>
+              </a:ext>
+            </a:extLst>
+          </p:cNvPr>
+          <p:cNvSpPr/>
+          <p:nvPr/>
+        </p:nvSpPr>
+        <p:spPr>
+          <a:xfrm>
+            <a:off x="7460268" y="3178130"/>
+            <a:ext cx="1028800" cy="386603"/>
+          </a:xfrm>
+          <a:prstGeom prst="rect">
+            <a:avLst/>
+          </a:prstGeom>
+          <a:ln w="19050">
+            <a:solidFill>
+              <a:srgbClr val="7030A0"/>
+            </a:solidFill>
+          </a:ln>
+          <a:effectLst/>
+        </p:spPr>
+        <p:style>
+          <a:lnRef idx="1">
+            <a:schemeClr val="accent4"/>
+          </a:lnRef>
+          <a:fillRef idx="2">
+            <a:schemeClr val="accent4"/>
+          </a:fillRef>
+          <a:effectRef idx="1">
+            <a:schemeClr val="accent4"/>
+          </a:effectRef>
+          <a:fontRef idx="minor">
+            <a:schemeClr val="dk1"/>
+          </a:fontRef>
+        </p:style>
+        <p:txBody>
+          <a:bodyPr rtlCol="0" anchor="ctr"/>
+          <a:lstStyle/>
+          <a:p>
+            <a:pPr algn="ctr"/>
+            <a:r>
+              <a:rPr lang="en-US" sz="1050" dirty="0">
+                <a:solidFill>
+                  <a:srgbClr val="7030A0"/>
+                </a:solidFill>
+              </a:rPr>
+              <a:t>&lt;&lt;Sub Class&gt;&gt;</a:t>
+            </a:r>
+          </a:p>
+          <a:p>
+            <a:pPr algn="ctr"/>
+            <a:r>
+              <a:rPr lang="en-US" sz="1050" dirty="0">
+                <a:solidFill>
+                  <a:srgbClr val="7030A0"/>
+                </a:solidFill>
+              </a:rPr>
+              <a:t>Investigator</a:t>
+            </a:r>
+            <a:endParaRPr lang="en-SG" sz="1050" dirty="0">
+              <a:solidFill>
+                <a:srgbClr val="7030A0"/>
+              </a:solidFill>
+            </a:endParaRPr>
+          </a:p>
+        </p:txBody>
+      </p:sp>
+      <p:cxnSp>
+        <p:nvCxnSpPr>
+          <p:cNvPr id="87" name="Elbow Connector 63">
+            <a:extLst>
+              <a:ext uri="{FF2B5EF4-FFF2-40B4-BE49-F238E27FC236}">
+                <a16:creationId xmlns:a16="http://schemas.microsoft.com/office/drawing/2014/main" id="{F979A497-9283-44AD-8F67-83BC4DADE184}"/>
+              </a:ext>
+            </a:extLst>
+          </p:cNvPr>
+          <p:cNvCxnSpPr>
+            <a:cxnSpLocks/>
+            <a:stCxn id="88" idx="3"/>
+            <a:endCxn id="62" idx="3"/>
+          </p:cNvCxnSpPr>
+          <p:nvPr/>
+        </p:nvCxnSpPr>
+        <p:spPr>
+          <a:xfrm rot="10800000">
+            <a:off x="7021864" y="3031446"/>
+            <a:ext cx="240987" cy="286688"/>
+          </a:xfrm>
+          <a:prstGeom prst="bentConnector3">
+            <a:avLst>
+              <a:gd name="adj1" fmla="val 50000"/>
+            </a:avLst>
+          </a:prstGeom>
+          <a:ln w="19050">
+            <a:solidFill>
+              <a:srgbClr val="7030A0"/>
+            </a:solidFill>
+            <a:prstDash val="sysDot"/>
+            <a:headEnd type="none" w="med" len="med"/>
+            <a:tailEnd type="none" w="med" len="med"/>
+          </a:ln>
+          <a:effectLst/>
+        </p:spPr>
+        <p:style>
+          <a:lnRef idx="1">
+            <a:schemeClr val="accent2"/>
+          </a:lnRef>
+          <a:fillRef idx="2">
+            <a:schemeClr val="accent2"/>
+          </a:fillRef>
+          <a:effectRef idx="1">
+            <a:schemeClr val="accent2"/>
+          </a:effectRef>
+          <a:fontRef idx="minor">
+            <a:schemeClr val="dk1"/>
+          </a:fontRef>
+        </p:style>
+      </p:cxnSp>
+      <p:sp>
+        <p:nvSpPr>
+          <p:cNvPr id="88" name="Isosceles Triangle 102">
+            <a:extLst>
+              <a:ext uri="{FF2B5EF4-FFF2-40B4-BE49-F238E27FC236}">
+                <a16:creationId xmlns:a16="http://schemas.microsoft.com/office/drawing/2014/main" id="{FB089D5C-B470-4816-8F51-EE509B4F3C31}"/>
+              </a:ext>
+            </a:extLst>
+          </p:cNvPr>
+          <p:cNvSpPr/>
+          <p:nvPr/>
+        </p:nvSpPr>
+        <p:spPr>
+          <a:xfrm rot="16200000" flipV="1">
+            <a:off x="7215359" y="3230372"/>
+            <a:ext cx="270504" cy="175523"/>
+          </a:xfrm>
+          <a:prstGeom prst="triangle">
+            <a:avLst/>
+          </a:prstGeom>
+          <a:ln w="19050">
+            <a:solidFill>
+              <a:srgbClr val="7030A0"/>
+            </a:solidFill>
+          </a:ln>
+          <a:effectLst/>
+        </p:spPr>
+        <p:style>
+          <a:lnRef idx="1">
+            <a:schemeClr val="accent4"/>
+          </a:lnRef>
+          <a:fillRef idx="2">
+            <a:schemeClr val="accent4"/>
+          </a:fillRef>
+          <a:effectRef idx="1">
+            <a:schemeClr val="accent4"/>
+          </a:effectRef>
+          <a:fontRef idx="minor">
+            <a:schemeClr val="dk1"/>
+          </a:fontRef>
+        </p:style>
+        <p:txBody>
+          <a:bodyPr rtlCol="0" anchor="ctr"/>
+          <a:lstStyle/>
+          <a:p>
+            <a:pPr algn="ctr"/>
+            <a:endParaRPr lang="en-SG" sz="1050" b="1">
+              <a:solidFill>
+                <a:srgbClr val="92D050"/>
+              </a:solidFill>
+            </a:endParaRPr>
+          </a:p>
+        </p:txBody>
+      </p:sp>
+      <p:sp>
+        <p:nvSpPr>
+          <p:cNvPr id="92" name="Flowchart: Decision 96">
+            <a:extLst>
+              <a:ext uri="{FF2B5EF4-FFF2-40B4-BE49-F238E27FC236}">
+                <a16:creationId xmlns:a16="http://schemas.microsoft.com/office/drawing/2014/main" id="{3D684499-273C-4106-8BB9-B4227780E342}"/>
+              </a:ext>
+            </a:extLst>
+          </p:cNvPr>
+          <p:cNvSpPr/>
+          <p:nvPr/>
+        </p:nvSpPr>
+        <p:spPr>
+          <a:xfrm>
+            <a:off x="7879532" y="3566041"/>
+            <a:ext cx="154284" cy="220042"/>
+          </a:xfrm>
+          <a:prstGeom prst="flowChartDecision">
+            <a:avLst/>
+          </a:prstGeom>
+          <a:solidFill>
+            <a:srgbClr val="7030A0"/>
+          </a:solidFill>
+          <a:ln w="19050">
+            <a:solidFill>
+              <a:srgbClr val="7030A0"/>
+            </a:solidFill>
+          </a:ln>
+          <a:effectLst/>
+        </p:spPr>
+        <p:style>
+          <a:lnRef idx="1">
+            <a:schemeClr val="accent6"/>
+          </a:lnRef>
+          <a:fillRef idx="2">
+            <a:schemeClr val="accent6"/>
+          </a:fillRef>
+          <a:effectRef idx="1">
+            <a:schemeClr val="accent6"/>
+          </a:effectRef>
+          <a:fontRef idx="minor">
+            <a:schemeClr val="dk1"/>
+          </a:fontRef>
+        </p:style>
+        <p:txBody>
+          <a:bodyPr rtlCol="0" anchor="ctr"/>
+          <a:lstStyle/>
+          <a:p>
+            <a:pPr algn="ctr"/>
+            <a:endParaRPr lang="en-US" sz="1050"/>
+          </a:p>
+        </p:txBody>
+      </p:sp>
+      <p:cxnSp>
+        <p:nvCxnSpPr>
+          <p:cNvPr id="93" name="Elbow Connector 78">
+            <a:extLst>
+              <a:ext uri="{FF2B5EF4-FFF2-40B4-BE49-F238E27FC236}">
+                <a16:creationId xmlns:a16="http://schemas.microsoft.com/office/drawing/2014/main" id="{D3CE841E-1BBD-4AC8-ACB9-40DB3EB77878}"/>
+              </a:ext>
+            </a:extLst>
+          </p:cNvPr>
+          <p:cNvCxnSpPr>
+            <a:cxnSpLocks/>
+            <a:endCxn id="52" idx="3"/>
+          </p:cNvCxnSpPr>
+          <p:nvPr/>
+        </p:nvCxnSpPr>
+        <p:spPr>
+          <a:xfrm rot="10800000">
+            <a:off x="5810116" y="3491989"/>
+            <a:ext cx="2164554" cy="472907"/>
+          </a:xfrm>
+          <a:prstGeom prst="bentConnector3">
+            <a:avLst>
+              <a:gd name="adj1" fmla="val 36388"/>
+            </a:avLst>
+          </a:prstGeom>
+          <a:ln w="19050">
+            <a:solidFill>
+              <a:srgbClr val="7030A0"/>
+            </a:solidFill>
+            <a:headEnd type="none" w="med" len="med"/>
+            <a:tailEnd type="arrow" w="med" len="med"/>
+          </a:ln>
+          <a:effectLst/>
+        </p:spPr>
+        <p:style>
+          <a:lnRef idx="1">
+            <a:schemeClr val="accent2"/>
+          </a:lnRef>
+          <a:fillRef idx="2">
+            <a:schemeClr val="accent2"/>
+          </a:fillRef>
+          <a:effectRef idx="1">
+            <a:schemeClr val="accent2"/>
+          </a:effectRef>
+          <a:fontRef idx="minor">
+            <a:schemeClr val="dk1"/>
+          </a:fontRef>
+        </p:style>
+      </p:cxnSp>
+      <p:cxnSp>
+        <p:nvCxnSpPr>
+          <p:cNvPr id="96" name="Elbow Connector 78">
+            <a:extLst>
+              <a:ext uri="{FF2B5EF4-FFF2-40B4-BE49-F238E27FC236}">
+                <a16:creationId xmlns:a16="http://schemas.microsoft.com/office/drawing/2014/main" id="{5DE9E1B1-7CB5-4AD4-B018-E0BB98F8F7AB}"/>
+              </a:ext>
+            </a:extLst>
+          </p:cNvPr>
+          <p:cNvCxnSpPr>
+            <a:cxnSpLocks/>
+          </p:cNvCxnSpPr>
+          <p:nvPr/>
+        </p:nvCxnSpPr>
+        <p:spPr>
+          <a:xfrm rot="16200000" flipH="1">
+            <a:off x="7930532" y="3805739"/>
+            <a:ext cx="370597" cy="318312"/>
+          </a:xfrm>
+          <a:prstGeom prst="bentConnector3">
+            <a:avLst>
+              <a:gd name="adj1" fmla="val 48630"/>
+            </a:avLst>
+          </a:prstGeom>
+          <a:ln w="19050">
+            <a:solidFill>
+              <a:srgbClr val="7030A0"/>
+            </a:solidFill>
+            <a:headEnd type="none" w="med" len="med"/>
+            <a:tailEnd type="arrow" w="med" len="med"/>
+          </a:ln>
+          <a:effectLst/>
+        </p:spPr>
+        <p:style>
+          <a:lnRef idx="1">
+            <a:schemeClr val="accent2"/>
+          </a:lnRef>
+          <a:fillRef idx="2">
+            <a:schemeClr val="accent2"/>
+          </a:fillRef>
+          <a:effectRef idx="1">
+            <a:schemeClr val="accent2"/>
+          </a:effectRef>
+          <a:fontRef idx="minor">
+            <a:schemeClr val="dk1"/>
+          </a:fontRef>
+        </p:style>
+      </p:cxnSp>
+      <p:sp>
+        <p:nvSpPr>
+          <p:cNvPr id="101" name="Rectangle 8">
+            <a:extLst>
+              <a:ext uri="{FF2B5EF4-FFF2-40B4-BE49-F238E27FC236}">
+                <a16:creationId xmlns:a16="http://schemas.microsoft.com/office/drawing/2014/main" id="{74EEDB94-3FEB-47A7-9ECC-2DE80C8A0B79}"/>
+              </a:ext>
+            </a:extLst>
+          </p:cNvPr>
+          <p:cNvSpPr/>
+          <p:nvPr/>
+        </p:nvSpPr>
+        <p:spPr>
+          <a:xfrm>
+            <a:off x="7875571" y="4147063"/>
+            <a:ext cx="708186" cy="285783"/>
+          </a:xfrm>
+          <a:prstGeom prst="rect">
+            <a:avLst/>
+          </a:prstGeom>
+          <a:ln w="19050">
+            <a:solidFill>
+              <a:srgbClr val="7030A0"/>
+            </a:solidFill>
+          </a:ln>
+          <a:effectLst/>
+        </p:spPr>
+        <p:style>
+          <a:lnRef idx="1">
+            <a:schemeClr val="accent4"/>
+          </a:lnRef>
+          <a:fillRef idx="2">
+            <a:schemeClr val="accent4"/>
+          </a:fillRef>
+          <a:effectRef idx="1">
+            <a:schemeClr val="accent4"/>
+          </a:effectRef>
+          <a:fontRef idx="minor">
+            <a:schemeClr val="dk1"/>
+          </a:fontRef>
+        </p:style>
+        <p:txBody>
+          <a:bodyPr rtlCol="0" anchor="ctr"/>
+          <a:lstStyle/>
+          <a:p>
+            <a:pPr algn="ctr"/>
+            <a:r>
+              <a:rPr lang="en-US" sz="1050" dirty="0">
+                <a:solidFill>
+                  <a:srgbClr val="7030A0"/>
+                </a:solidFill>
+              </a:rPr>
+              <a:t>Rank</a:t>
+            </a:r>
+            <a:endParaRPr lang="en-SG" sz="1050" dirty="0">
+              <a:solidFill>
+                <a:srgbClr val="7030A0"/>
+              </a:solidFill>
+            </a:endParaRPr>
+          </a:p>
+        </p:txBody>
+      </p:sp>
+      <p:sp>
+        <p:nvSpPr>
+          <p:cNvPr id="109" name="Rectangle 8">
+            <a:extLst>
+              <a:ext uri="{FF2B5EF4-FFF2-40B4-BE49-F238E27FC236}">
+                <a16:creationId xmlns:a16="http://schemas.microsoft.com/office/drawing/2014/main" id="{43A795F5-FFD0-4222-9114-145355FDE7AD}"/>
+              </a:ext>
+            </a:extLst>
+          </p:cNvPr>
+          <p:cNvSpPr/>
+          <p:nvPr/>
+        </p:nvSpPr>
+        <p:spPr>
+          <a:xfrm>
+            <a:off x="6443612" y="4124921"/>
+            <a:ext cx="1332788" cy="346760"/>
+          </a:xfrm>
+          <a:prstGeom prst="rect">
+            <a:avLst/>
+          </a:prstGeom>
+          <a:ln w="19050">
+            <a:solidFill>
+              <a:srgbClr val="7030A0"/>
+            </a:solidFill>
+          </a:ln>
+          <a:effectLst/>
+        </p:spPr>
+        <p:style>
+          <a:lnRef idx="1">
+            <a:schemeClr val="accent4"/>
+          </a:lnRef>
+          <a:fillRef idx="2">
+            <a:schemeClr val="accent4"/>
+          </a:fillRef>
+          <a:effectRef idx="1">
+            <a:schemeClr val="accent4"/>
+          </a:effectRef>
+          <a:fontRef idx="minor">
+            <a:schemeClr val="dk1"/>
+          </a:fontRef>
+        </p:style>
+        <p:txBody>
+          <a:bodyPr rtlCol="0" anchor="ctr"/>
+          <a:lstStyle/>
+          <a:p>
+            <a:pPr algn="ctr"/>
+            <a:r>
+              <a:rPr lang="en-US" sz="1050" dirty="0" err="1">
+                <a:solidFill>
+                  <a:srgbClr val="7030A0"/>
+                </a:solidFill>
+              </a:rPr>
+              <a:t>UniqueCrimeCaseList</a:t>
+            </a:r>
+            <a:endParaRPr lang="en-SG" sz="1050" dirty="0">
+              <a:solidFill>
+                <a:srgbClr val="7030A0"/>
+              </a:solidFill>
+            </a:endParaRPr>
+          </a:p>
+        </p:txBody>
+      </p:sp>
+      <p:cxnSp>
+        <p:nvCxnSpPr>
+          <p:cNvPr id="113" name="Elbow Connector 106">
+            <a:extLst>
+              <a:ext uri="{FF2B5EF4-FFF2-40B4-BE49-F238E27FC236}">
+                <a16:creationId xmlns:a16="http://schemas.microsoft.com/office/drawing/2014/main" id="{89288A86-FC4B-4013-9679-85028258712B}"/>
+              </a:ext>
+            </a:extLst>
+          </p:cNvPr>
+          <p:cNvCxnSpPr>
+            <a:cxnSpLocks/>
+            <a:stCxn id="9" idx="1"/>
+            <a:endCxn id="52" idx="2"/>
+          </p:cNvCxnSpPr>
+          <p:nvPr/>
+        </p:nvCxnSpPr>
+        <p:spPr>
+          <a:xfrm rot="16200000" flipH="1">
+            <a:off x="3649010" y="2170655"/>
+            <a:ext cx="76483" cy="2912941"/>
+          </a:xfrm>
+          <a:prstGeom prst="bentConnector3">
+            <a:avLst>
+              <a:gd name="adj1" fmla="val 319186"/>
+            </a:avLst>
+          </a:prstGeom>
+          <a:ln w="19050">
+            <a:solidFill>
+              <a:srgbClr val="7030A0"/>
+            </a:solidFill>
+            <a:prstDash val="solid"/>
+            <a:headEnd type="none" w="med" len="med"/>
+            <a:tailEnd type="arrow" w="med" len="med"/>
+          </a:ln>
+          <a:effectLst/>
+        </p:spPr>
+        <p:style>
+          <a:lnRef idx="1">
+            <a:schemeClr val="accent2"/>
+          </a:lnRef>
+          <a:fillRef idx="2">
+            <a:schemeClr val="accent2"/>
+          </a:fillRef>
+          <a:effectRef idx="1">
+            <a:schemeClr val="accent2"/>
+          </a:effectRef>
+          <a:fontRef idx="minor">
+            <a:schemeClr val="dk1"/>
+          </a:fontRef>
+        </p:style>
+      </p:cxnSp>
+      <p:sp>
+        <p:nvSpPr>
+          <p:cNvPr id="117" name="TextBox 116">
+            <a:extLst>
+              <a:ext uri="{FF2B5EF4-FFF2-40B4-BE49-F238E27FC236}">
+                <a16:creationId xmlns:a16="http://schemas.microsoft.com/office/drawing/2014/main" id="{25F9645C-5258-4714-8921-BC71601D1B75}"/>
+              </a:ext>
+            </a:extLst>
+          </p:cNvPr>
+          <p:cNvSpPr txBox="1"/>
+          <p:nvPr/>
+        </p:nvSpPr>
+        <p:spPr>
+          <a:xfrm>
+            <a:off x="3701206" y="3618354"/>
+            <a:ext cx="881018" cy="261610"/>
+          </a:xfrm>
+          <a:prstGeom prst="rect">
+            <a:avLst/>
+          </a:prstGeom>
+          <a:noFill/>
+        </p:spPr>
+        <p:txBody>
+          <a:bodyPr wrap="square" rtlCol="0">
+            <a:spAutoFit/>
+          </a:bodyPr>
+          <a:lstStyle/>
+          <a:p>
+            <a:pPr algn="r"/>
+            <a:r>
+              <a:rPr lang="en-US" sz="1100" dirty="0">
+                <a:solidFill>
+                  <a:srgbClr val="7030A0"/>
+                </a:solidFill>
+              </a:rPr>
+              <a:t>filtered list</a:t>
+            </a:r>
+            <a:endParaRPr lang="en-SG" sz="1100" dirty="0">
+              <a:solidFill>
+                <a:srgbClr val="7030A0"/>
+              </a:solidFill>
+            </a:endParaRPr>
+          </a:p>
+        </p:txBody>
+      </p:sp>
+      <p:sp>
+        <p:nvSpPr>
+          <p:cNvPr id="123" name="TextBox 122">
+            <a:extLst>
+              <a:ext uri="{FF2B5EF4-FFF2-40B4-BE49-F238E27FC236}">
+                <a16:creationId xmlns:a16="http://schemas.microsoft.com/office/drawing/2014/main" id="{879ABBBF-8305-468A-95E4-770270F9C22B}"/>
+              </a:ext>
+            </a:extLst>
+          </p:cNvPr>
+          <p:cNvSpPr txBox="1"/>
+          <p:nvPr/>
+        </p:nvSpPr>
+        <p:spPr>
+          <a:xfrm>
+            <a:off x="4829801" y="4057721"/>
+            <a:ext cx="189257" cy="178683"/>
+          </a:xfrm>
+          <a:prstGeom prst="rect">
+            <a:avLst/>
+          </a:prstGeom>
+          <a:noFill/>
+        </p:spPr>
+        <p:txBody>
+          <a:bodyPr wrap="square" lIns="0" tIns="0" rIns="0" bIns="0" rtlCol="0">
+            <a:noAutofit/>
+          </a:bodyPr>
+          <a:lstStyle/>
+          <a:p>
+            <a:pPr algn="ctr"/>
+            <a:r>
+              <a:rPr lang="en-US" sz="1100" dirty="0">
+                <a:solidFill>
+                  <a:srgbClr val="7030A0"/>
+                </a:solidFill>
+              </a:rPr>
+              <a:t>*</a:t>
+            </a:r>
+            <a:endParaRPr lang="en-SG" sz="1100" dirty="0">
+              <a:solidFill>
+                <a:srgbClr val="7030A0"/>
+              </a:solidFill>
+            </a:endParaRPr>
+          </a:p>
+        </p:txBody>
+      </p:sp>
+      <p:sp>
+        <p:nvSpPr>
+          <p:cNvPr id="125" name="Rectangle 8">
+            <a:extLst>
+              <a:ext uri="{FF2B5EF4-FFF2-40B4-BE49-F238E27FC236}">
+                <a16:creationId xmlns:a16="http://schemas.microsoft.com/office/drawing/2014/main" id="{A250EA69-F922-4D81-9ACC-4E86E6B1D860}"/>
+              </a:ext>
+            </a:extLst>
+          </p:cNvPr>
+          <p:cNvSpPr/>
+          <p:nvPr/>
+        </p:nvSpPr>
+        <p:spPr>
+          <a:xfrm>
+            <a:off x="4627918" y="4239491"/>
+            <a:ext cx="782281" cy="285783"/>
+          </a:xfrm>
+          <a:prstGeom prst="rect">
+            <a:avLst/>
+          </a:prstGeom>
+          <a:ln w="19050">
+            <a:solidFill>
+              <a:srgbClr val="7030A0"/>
+            </a:solidFill>
+          </a:ln>
+          <a:effectLst/>
+        </p:spPr>
+        <p:style>
+          <a:lnRef idx="1">
+            <a:schemeClr val="accent4"/>
+          </a:lnRef>
+          <a:fillRef idx="2">
+            <a:schemeClr val="accent4"/>
+          </a:fillRef>
+          <a:effectRef idx="1">
+            <a:schemeClr val="accent4"/>
+          </a:effectRef>
+          <a:fontRef idx="minor">
+            <a:schemeClr val="dk1"/>
+          </a:fontRef>
+        </p:style>
+        <p:txBody>
+          <a:bodyPr rtlCol="0" anchor="ctr"/>
+          <a:lstStyle/>
+          <a:p>
+            <a:pPr algn="ctr"/>
+            <a:r>
+              <a:rPr lang="en-US" sz="1050" dirty="0" err="1">
+                <a:solidFill>
+                  <a:srgbClr val="7030A0"/>
+                </a:solidFill>
+              </a:rPr>
+              <a:t>CrimeCase</a:t>
+            </a:r>
+            <a:endParaRPr lang="en-SG" sz="1050" dirty="0">
+              <a:solidFill>
+                <a:srgbClr val="7030A0"/>
+              </a:solidFill>
+            </a:endParaRPr>
+          </a:p>
+        </p:txBody>
+      </p:sp>
+      <p:sp>
+        <p:nvSpPr>
+          <p:cNvPr id="126" name="Flowchart: Decision 96">
+            <a:extLst>
+              <a:ext uri="{FF2B5EF4-FFF2-40B4-BE49-F238E27FC236}">
+                <a16:creationId xmlns:a16="http://schemas.microsoft.com/office/drawing/2014/main" id="{7DFA42AF-8A31-40A2-AD7A-28AFAF4D4520}"/>
+              </a:ext>
+            </a:extLst>
+          </p:cNvPr>
+          <p:cNvSpPr/>
+          <p:nvPr/>
+        </p:nvSpPr>
+        <p:spPr>
+          <a:xfrm rot="16200000">
+            <a:off x="5221075" y="3704362"/>
+            <a:ext cx="236048" cy="173380"/>
+          </a:xfrm>
+          <a:prstGeom prst="flowChartDecision">
+            <a:avLst/>
+          </a:prstGeom>
+          <a:noFill/>
+          <a:ln w="19050">
+            <a:solidFill>
+              <a:srgbClr val="7030A0"/>
+            </a:solidFill>
+          </a:ln>
+          <a:effectLst/>
+        </p:spPr>
+        <p:style>
+          <a:lnRef idx="1">
+            <a:schemeClr val="accent6"/>
+          </a:lnRef>
+          <a:fillRef idx="2">
+            <a:schemeClr val="accent6"/>
+          </a:fillRef>
+          <a:effectRef idx="1">
+            <a:schemeClr val="accent6"/>
+          </a:effectRef>
+          <a:fontRef idx="minor">
+            <a:schemeClr val="dk1"/>
+          </a:fontRef>
+        </p:style>
+        <p:txBody>
+          <a:bodyPr rtlCol="0" anchor="ctr"/>
+          <a:lstStyle/>
+          <a:p>
+            <a:pPr algn="ctr"/>
+            <a:endParaRPr lang="en-US" sz="1050"/>
+          </a:p>
+        </p:txBody>
+      </p:sp>
+      <p:cxnSp>
+        <p:nvCxnSpPr>
+          <p:cNvPr id="127" name="Elbow Connector 68">
+            <a:extLst>
+              <a:ext uri="{FF2B5EF4-FFF2-40B4-BE49-F238E27FC236}">
+                <a16:creationId xmlns:a16="http://schemas.microsoft.com/office/drawing/2014/main" id="{A574F277-8A67-4FD5-970F-FDDA5B057671}"/>
+              </a:ext>
+            </a:extLst>
+          </p:cNvPr>
+          <p:cNvCxnSpPr>
+            <a:cxnSpLocks/>
+            <a:stCxn id="126" idx="1"/>
+            <a:endCxn id="125" idx="0"/>
+          </p:cNvCxnSpPr>
+          <p:nvPr/>
+        </p:nvCxnSpPr>
+        <p:spPr>
+          <a:xfrm rot="5400000">
+            <a:off x="5013872" y="3914263"/>
+            <a:ext cx="330415" cy="320040"/>
+          </a:xfrm>
+          <a:prstGeom prst="bentConnector3">
+            <a:avLst>
+              <a:gd name="adj1" fmla="val 50000"/>
+            </a:avLst>
+          </a:prstGeom>
+          <a:ln w="19050">
+            <a:solidFill>
+              <a:srgbClr val="7030A0"/>
+            </a:solidFill>
+            <a:headEnd type="none" w="med" len="med"/>
+            <a:tailEnd type="arrow" w="med" len="med"/>
+          </a:ln>
+          <a:effectLst/>
+        </p:spPr>
+        <p:style>
+          <a:lnRef idx="1">
+            <a:schemeClr val="accent2"/>
+          </a:lnRef>
+          <a:fillRef idx="2">
+            <a:schemeClr val="accent2"/>
+          </a:fillRef>
+          <a:effectRef idx="1">
+            <a:schemeClr val="accent2"/>
+          </a:effectRef>
+          <a:fontRef idx="minor">
+            <a:schemeClr val="dk1"/>
+          </a:fontRef>
+        </p:style>
+      </p:cxnSp>
     </p:spTree>
     <p:extLst>
       <p:ext uri="{BB962C8B-B14F-4D97-AF65-F5344CB8AC3E}">
@@ -5763,13 +6652,6 @@
   <p:clrMapOvr>
     <a:masterClrMapping/>
   </p:clrMapOvr>
-  <p:timing>
-    <p:tnLst>
-      <p:par>
-        <p:cTn id="1" dur="indefinite" restart="never" nodeType="tmRoot"/>
-      </p:par>
-    </p:tnLst>
-  </p:timing>
 </p:sld>
 </file>
 

</xml_diff>

<commit_message>
Update images for DG
</commit_message>
<xml_diff>
--- a/docs/diagrams/ModelComponentClassDiagram.pptx
+++ b/docs/diagrams/ModelComponentClassDiagram.pptx
@@ -208,7 +208,7 @@
           <a:p>
             <a:fld id="{F5CC4B3F-88C1-4FFA-B1B6-F41C21DC6924}" type="datetimeFigureOut">
               <a:rPr lang="en-US" smtClean="0"/>
-              <a:t>4/5/2018</a:t>
+              <a:t>12-Apr-18</a:t>
             </a:fld>
             <a:endParaRPr lang="en-US"/>
           </a:p>
@@ -654,7 +654,7 @@
           <a:p>
             <a:fld id="{78C97017-6FC3-485B-9764-EAC9E56C1D49}" type="datetimeFigureOut">
               <a:rPr lang="en-US" smtClean="0"/>
-              <a:t>4/5/2018</a:t>
+              <a:t>12-Apr-18</a:t>
             </a:fld>
             <a:endParaRPr lang="en-US"/>
           </a:p>
@@ -822,7 +822,7 @@
           <a:p>
             <a:fld id="{78C97017-6FC3-485B-9764-EAC9E56C1D49}" type="datetimeFigureOut">
               <a:rPr lang="en-US" smtClean="0"/>
-              <a:t>4/5/2018</a:t>
+              <a:t>12-Apr-18</a:t>
             </a:fld>
             <a:endParaRPr lang="en-US"/>
           </a:p>
@@ -1000,7 +1000,7 @@
           <a:p>
             <a:fld id="{78C97017-6FC3-485B-9764-EAC9E56C1D49}" type="datetimeFigureOut">
               <a:rPr lang="en-US" smtClean="0"/>
-              <a:t>4/5/2018</a:t>
+              <a:t>12-Apr-18</a:t>
             </a:fld>
             <a:endParaRPr lang="en-US"/>
           </a:p>
@@ -1168,7 +1168,7 @@
           <a:p>
             <a:fld id="{78C97017-6FC3-485B-9764-EAC9E56C1D49}" type="datetimeFigureOut">
               <a:rPr lang="en-US" smtClean="0"/>
-              <a:t>4/5/2018</a:t>
+              <a:t>12-Apr-18</a:t>
             </a:fld>
             <a:endParaRPr lang="en-US"/>
           </a:p>
@@ -1413,7 +1413,7 @@
           <a:p>
             <a:fld id="{78C97017-6FC3-485B-9764-EAC9E56C1D49}" type="datetimeFigureOut">
               <a:rPr lang="en-US" smtClean="0"/>
-              <a:t>4/5/2018</a:t>
+              <a:t>12-Apr-18</a:t>
             </a:fld>
             <a:endParaRPr lang="en-US"/>
           </a:p>
@@ -1698,7 +1698,7 @@
           <a:p>
             <a:fld id="{78C97017-6FC3-485B-9764-EAC9E56C1D49}" type="datetimeFigureOut">
               <a:rPr lang="en-US" smtClean="0"/>
-              <a:t>4/5/2018</a:t>
+              <a:t>12-Apr-18</a:t>
             </a:fld>
             <a:endParaRPr lang="en-US"/>
           </a:p>
@@ -2117,7 +2117,7 @@
           <a:p>
             <a:fld id="{78C97017-6FC3-485B-9764-EAC9E56C1D49}" type="datetimeFigureOut">
               <a:rPr lang="en-US" smtClean="0"/>
-              <a:t>4/5/2018</a:t>
+              <a:t>12-Apr-18</a:t>
             </a:fld>
             <a:endParaRPr lang="en-US"/>
           </a:p>
@@ -2234,7 +2234,7 @@
           <a:p>
             <a:fld id="{78C97017-6FC3-485B-9764-EAC9E56C1D49}" type="datetimeFigureOut">
               <a:rPr lang="en-US" smtClean="0"/>
-              <a:t>4/5/2018</a:t>
+              <a:t>12-Apr-18</a:t>
             </a:fld>
             <a:endParaRPr lang="en-US"/>
           </a:p>
@@ -2329,7 +2329,7 @@
           <a:p>
             <a:fld id="{78C97017-6FC3-485B-9764-EAC9E56C1D49}" type="datetimeFigureOut">
               <a:rPr lang="en-US" smtClean="0"/>
-              <a:t>4/5/2018</a:t>
+              <a:t>12-Apr-18</a:t>
             </a:fld>
             <a:endParaRPr lang="en-US"/>
           </a:p>
@@ -2604,7 +2604,7 @@
           <a:p>
             <a:fld id="{78C97017-6FC3-485B-9764-EAC9E56C1D49}" type="datetimeFigureOut">
               <a:rPr lang="en-US" smtClean="0"/>
-              <a:t>4/5/2018</a:t>
+              <a:t>12-Apr-18</a:t>
             </a:fld>
             <a:endParaRPr lang="en-US"/>
           </a:p>
@@ -2856,7 +2856,7 @@
           <a:p>
             <a:fld id="{78C97017-6FC3-485B-9764-EAC9E56C1D49}" type="datetimeFigureOut">
               <a:rPr lang="en-US" smtClean="0"/>
-              <a:t>4/5/2018</a:t>
+              <a:t>12-Apr-18</a:t>
             </a:fld>
             <a:endParaRPr lang="en-US"/>
           </a:p>
@@ -3067,7 +3067,7 @@
           <a:p>
             <a:fld id="{78C97017-6FC3-485B-9764-EAC9E56C1D49}" type="datetimeFigureOut">
               <a:rPr lang="en-US" smtClean="0"/>
-              <a:t>4/5/2018</a:t>
+              <a:t>12-Apr-18</a:t>
             </a:fld>
             <a:endParaRPr lang="en-US"/>
           </a:p>
@@ -6135,11 +6135,11 @@
         <p:spPr>
           <a:xfrm rot="10800000">
             <a:off x="5810116" y="3491989"/>
-            <a:ext cx="2164554" cy="472907"/>
+            <a:ext cx="1650152" cy="1"/>
           </a:xfrm>
           <a:prstGeom prst="bentConnector3">
             <a:avLst>
-              <a:gd name="adj1" fmla="val 36388"/>
+              <a:gd name="adj1" fmla="val 50000"/>
             </a:avLst>
           </a:prstGeom>
           <a:ln w="19050">
@@ -6276,68 +6276,6 @@
           </a:p>
         </p:txBody>
       </p:sp>
-      <p:sp>
-        <p:nvSpPr>
-          <p:cNvPr id="109" name="Rectangle 8">
-            <a:extLst>
-              <a:ext uri="{FF2B5EF4-FFF2-40B4-BE49-F238E27FC236}">
-                <a16:creationId xmlns:a16="http://schemas.microsoft.com/office/drawing/2014/main" id="{43A795F5-FFD0-4222-9114-145355FDE7AD}"/>
-              </a:ext>
-            </a:extLst>
-          </p:cNvPr>
-          <p:cNvSpPr/>
-          <p:nvPr/>
-        </p:nvSpPr>
-        <p:spPr>
-          <a:xfrm>
-            <a:off x="6443612" y="4124921"/>
-            <a:ext cx="1332788" cy="346760"/>
-          </a:xfrm>
-          <a:prstGeom prst="rect">
-            <a:avLst/>
-          </a:prstGeom>
-          <a:ln w="19050">
-            <a:solidFill>
-              <a:srgbClr val="7030A0"/>
-            </a:solidFill>
-          </a:ln>
-          <a:effectLst/>
-        </p:spPr>
-        <p:style>
-          <a:lnRef idx="1">
-            <a:schemeClr val="accent4"/>
-          </a:lnRef>
-          <a:fillRef idx="2">
-            <a:schemeClr val="accent4"/>
-          </a:fillRef>
-          <a:effectRef idx="1">
-            <a:schemeClr val="accent4"/>
-          </a:effectRef>
-          <a:fontRef idx="minor">
-            <a:schemeClr val="dk1"/>
-          </a:fontRef>
-        </p:style>
-        <p:txBody>
-          <a:bodyPr rtlCol="0" anchor="ctr"/>
-          <a:lstStyle/>
-          <a:p>
-            <a:pPr algn="ctr"/>
-            <a:r>
-              <a:rPr lang="en-US" sz="1050" dirty="0" err="1">
-                <a:solidFill>
-                  <a:srgbClr val="7030A0"/>
-                </a:solidFill>
-              </a:rPr>
-              <a:t>UniqueCrimeCaseList</a:t>
-            </a:r>
-            <a:endParaRPr lang="en-SG" sz="1050" dirty="0">
-              <a:solidFill>
-                <a:srgbClr val="7030A0"/>
-              </a:solidFill>
-            </a:endParaRPr>
-          </a:p>
-        </p:txBody>
-      </p:sp>
       <p:cxnSp>
         <p:nvCxnSpPr>
           <p:cNvPr id="113" name="Elbow Connector 106">
@@ -6541,12 +6479,61 @@
           </a:p>
         </p:txBody>
       </p:sp>
-      <p:sp>
-        <p:nvSpPr>
-          <p:cNvPr id="126" name="Flowchart: Decision 96">
+      <p:cxnSp>
+        <p:nvCxnSpPr>
+          <p:cNvPr id="127" name="Elbow Connector 68">
             <a:extLst>
               <a:ext uri="{FF2B5EF4-FFF2-40B4-BE49-F238E27FC236}">
-                <a16:creationId xmlns:a16="http://schemas.microsoft.com/office/drawing/2014/main" id="{7DFA42AF-8A31-40A2-AD7A-28AFAF4D4520}"/>
+                <a16:creationId xmlns:a16="http://schemas.microsoft.com/office/drawing/2014/main" id="{A574F277-8A67-4FD5-970F-FDDA5B057671}"/>
+              </a:ext>
+            </a:extLst>
+          </p:cNvPr>
+          <p:cNvCxnSpPr>
+            <a:cxnSpLocks/>
+            <a:endCxn id="125" idx="0"/>
+          </p:cNvCxnSpPr>
+          <p:nvPr/>
+        </p:nvCxnSpPr>
+        <p:spPr>
+          <a:xfrm rot="5400000">
+            <a:off x="5013872" y="3914263"/>
+            <a:ext cx="330415" cy="320040"/>
+          </a:xfrm>
+          <a:prstGeom prst="bentConnector3">
+            <a:avLst>
+              <a:gd name="adj1" fmla="val 50000"/>
+            </a:avLst>
+          </a:prstGeom>
+          <a:ln w="19050">
+            <a:solidFill>
+              <a:srgbClr val="7030A0"/>
+            </a:solidFill>
+            <a:headEnd type="none" w="med" len="med"/>
+            <a:tailEnd type="arrow" w="med" len="med"/>
+          </a:ln>
+          <a:effectLst/>
+        </p:spPr>
+        <p:style>
+          <a:lnRef idx="1">
+            <a:schemeClr val="accent2"/>
+          </a:lnRef>
+          <a:fillRef idx="2">
+            <a:schemeClr val="accent2"/>
+          </a:fillRef>
+          <a:effectRef idx="1">
+            <a:schemeClr val="accent2"/>
+          </a:effectRef>
+          <a:fontRef idx="minor">
+            <a:schemeClr val="dk1"/>
+          </a:fontRef>
+        </p:style>
+      </p:cxnSp>
+      <p:sp>
+        <p:nvSpPr>
+          <p:cNvPr id="73" name="Flowchart: Decision 96">
+            <a:extLst>
+              <a:ext uri="{FF2B5EF4-FFF2-40B4-BE49-F238E27FC236}">
+                <a16:creationId xmlns:a16="http://schemas.microsoft.com/office/drawing/2014/main" id="{793148DC-91F0-4465-8BAF-590FC55ABD5B}"/>
               </a:ext>
             </a:extLst>
           </p:cNvPr>
@@ -6554,8 +6541,8 @@
           <p:nvPr/>
         </p:nvSpPr>
         <p:spPr>
-          <a:xfrm rot="16200000">
-            <a:off x="5221075" y="3704362"/>
+          <a:xfrm rot="5400000">
+            <a:off x="5218081" y="3696701"/>
             <a:ext cx="236048" cy="173380"/>
           </a:xfrm>
           <a:prstGeom prst="flowChartDecision">
@@ -6592,56 +6579,6 @@
           </a:p>
         </p:txBody>
       </p:sp>
-      <p:cxnSp>
-        <p:nvCxnSpPr>
-          <p:cNvPr id="127" name="Elbow Connector 68">
-            <a:extLst>
-              <a:ext uri="{FF2B5EF4-FFF2-40B4-BE49-F238E27FC236}">
-                <a16:creationId xmlns:a16="http://schemas.microsoft.com/office/drawing/2014/main" id="{A574F277-8A67-4FD5-970F-FDDA5B057671}"/>
-              </a:ext>
-            </a:extLst>
-          </p:cNvPr>
-          <p:cNvCxnSpPr>
-            <a:cxnSpLocks/>
-            <a:stCxn id="126" idx="1"/>
-            <a:endCxn id="125" idx="0"/>
-          </p:cNvCxnSpPr>
-          <p:nvPr/>
-        </p:nvCxnSpPr>
-        <p:spPr>
-          <a:xfrm rot="5400000">
-            <a:off x="5013872" y="3914263"/>
-            <a:ext cx="330415" cy="320040"/>
-          </a:xfrm>
-          <a:prstGeom prst="bentConnector3">
-            <a:avLst>
-              <a:gd name="adj1" fmla="val 50000"/>
-            </a:avLst>
-          </a:prstGeom>
-          <a:ln w="19050">
-            <a:solidFill>
-              <a:srgbClr val="7030A0"/>
-            </a:solidFill>
-            <a:headEnd type="none" w="med" len="med"/>
-            <a:tailEnd type="arrow" w="med" len="med"/>
-          </a:ln>
-          <a:effectLst/>
-        </p:spPr>
-        <p:style>
-          <a:lnRef idx="1">
-            <a:schemeClr val="accent2"/>
-          </a:lnRef>
-          <a:fillRef idx="2">
-            <a:schemeClr val="accent2"/>
-          </a:fillRef>
-          <a:effectRef idx="1">
-            <a:schemeClr val="accent2"/>
-          </a:effectRef>
-          <a:fontRef idx="minor">
-            <a:schemeClr val="dk1"/>
-          </a:fontRef>
-        </p:style>
-      </p:cxnSp>
     </p:spTree>
     <p:extLst>
       <p:ext uri="{BB962C8B-B14F-4D97-AF65-F5344CB8AC3E}">

</xml_diff>

<commit_message>
Update component structure diagrams.
</commit_message>
<xml_diff>
--- a/docs/diagrams/ModelComponentClassDiagram.pptx
+++ b/docs/diagrams/ModelComponentClassDiagram.pptx
@@ -126,6 +126,10 @@
 </p:presentation>
 </file>
 
+<file path=ppt/revisionInfo.xml><?xml version="1.0" encoding="utf-8"?>
+<p1510:revInfo xmlns:a="http://schemas.openxmlformats.org/drawingml/2006/main" xmlns:r="http://schemas.openxmlformats.org/officeDocument/2006/relationships" xmlns:p1510="http://schemas.microsoft.com/office/powerpoint/2015/10/main"/>
+</file>
+
 <file path=ppt/notesMasters/notesMaster1.xml><?xml version="1.0" encoding="utf-8"?>
 <p:notesMaster xmlns:a="http://schemas.openxmlformats.org/drawingml/2006/main" xmlns:r="http://schemas.openxmlformats.org/officeDocument/2006/relationships" xmlns:p="http://schemas.openxmlformats.org/presentationml/2006/main">
   <p:cSld>
@@ -208,7 +212,7 @@
           <a:p>
             <a:fld id="{F5CC4B3F-88C1-4FFA-B1B6-F41C21DC6924}" type="datetimeFigureOut">
               <a:rPr lang="en-US" smtClean="0"/>
-              <a:t>12-Apr-18</a:t>
+              <a:t>4/15/2018</a:t>
             </a:fld>
             <a:endParaRPr lang="en-US"/>
           </a:p>
@@ -654,7 +658,7 @@
           <a:p>
             <a:fld id="{78C97017-6FC3-485B-9764-EAC9E56C1D49}" type="datetimeFigureOut">
               <a:rPr lang="en-US" smtClean="0"/>
-              <a:t>12-Apr-18</a:t>
+              <a:t>4/15/2018</a:t>
             </a:fld>
             <a:endParaRPr lang="en-US"/>
           </a:p>
@@ -822,7 +826,7 @@
           <a:p>
             <a:fld id="{78C97017-6FC3-485B-9764-EAC9E56C1D49}" type="datetimeFigureOut">
               <a:rPr lang="en-US" smtClean="0"/>
-              <a:t>12-Apr-18</a:t>
+              <a:t>4/15/2018</a:t>
             </a:fld>
             <a:endParaRPr lang="en-US"/>
           </a:p>
@@ -1000,7 +1004,7 @@
           <a:p>
             <a:fld id="{78C97017-6FC3-485B-9764-EAC9E56C1D49}" type="datetimeFigureOut">
               <a:rPr lang="en-US" smtClean="0"/>
-              <a:t>12-Apr-18</a:t>
+              <a:t>4/15/2018</a:t>
             </a:fld>
             <a:endParaRPr lang="en-US"/>
           </a:p>
@@ -1168,7 +1172,7 @@
           <a:p>
             <a:fld id="{78C97017-6FC3-485B-9764-EAC9E56C1D49}" type="datetimeFigureOut">
               <a:rPr lang="en-US" smtClean="0"/>
-              <a:t>12-Apr-18</a:t>
+              <a:t>4/15/2018</a:t>
             </a:fld>
             <a:endParaRPr lang="en-US"/>
           </a:p>
@@ -1413,7 +1417,7 @@
           <a:p>
             <a:fld id="{78C97017-6FC3-485B-9764-EAC9E56C1D49}" type="datetimeFigureOut">
               <a:rPr lang="en-US" smtClean="0"/>
-              <a:t>12-Apr-18</a:t>
+              <a:t>4/15/2018</a:t>
             </a:fld>
             <a:endParaRPr lang="en-US"/>
           </a:p>
@@ -1698,7 +1702,7 @@
           <a:p>
             <a:fld id="{78C97017-6FC3-485B-9764-EAC9E56C1D49}" type="datetimeFigureOut">
               <a:rPr lang="en-US" smtClean="0"/>
-              <a:t>12-Apr-18</a:t>
+              <a:t>4/15/2018</a:t>
             </a:fld>
             <a:endParaRPr lang="en-US"/>
           </a:p>
@@ -2117,7 +2121,7 @@
           <a:p>
             <a:fld id="{78C97017-6FC3-485B-9764-EAC9E56C1D49}" type="datetimeFigureOut">
               <a:rPr lang="en-US" smtClean="0"/>
-              <a:t>12-Apr-18</a:t>
+              <a:t>4/15/2018</a:t>
             </a:fld>
             <a:endParaRPr lang="en-US"/>
           </a:p>
@@ -2234,7 +2238,7 @@
           <a:p>
             <a:fld id="{78C97017-6FC3-485B-9764-EAC9E56C1D49}" type="datetimeFigureOut">
               <a:rPr lang="en-US" smtClean="0"/>
-              <a:t>12-Apr-18</a:t>
+              <a:t>4/15/2018</a:t>
             </a:fld>
             <a:endParaRPr lang="en-US"/>
           </a:p>
@@ -2329,7 +2333,7 @@
           <a:p>
             <a:fld id="{78C97017-6FC3-485B-9764-EAC9E56C1D49}" type="datetimeFigureOut">
               <a:rPr lang="en-US" smtClean="0"/>
-              <a:t>12-Apr-18</a:t>
+              <a:t>4/15/2018</a:t>
             </a:fld>
             <a:endParaRPr lang="en-US"/>
           </a:p>
@@ -2604,7 +2608,7 @@
           <a:p>
             <a:fld id="{78C97017-6FC3-485B-9764-EAC9E56C1D49}" type="datetimeFigureOut">
               <a:rPr lang="en-US" smtClean="0"/>
-              <a:t>12-Apr-18</a:t>
+              <a:t>4/15/2018</a:t>
             </a:fld>
             <a:endParaRPr lang="en-US"/>
           </a:p>
@@ -2856,7 +2860,7 @@
           <a:p>
             <a:fld id="{78C97017-6FC3-485B-9764-EAC9E56C1D49}" type="datetimeFigureOut">
               <a:rPr lang="en-US" smtClean="0"/>
-              <a:t>12-Apr-18</a:t>
+              <a:t>4/15/2018</a:t>
             </a:fld>
             <a:endParaRPr lang="en-US"/>
           </a:p>
@@ -3067,7 +3071,7 @@
           <a:p>
             <a:fld id="{78C97017-6FC3-485B-9764-EAC9E56C1D49}" type="datetimeFigureOut">
               <a:rPr lang="en-US" smtClean="0"/>
-              <a:t>12-Apr-18</a:t>
+              <a:t>4/15/2018</a:t>
             </a:fld>
             <a:endParaRPr lang="en-US"/>
           </a:p>
@@ -3450,7 +3454,7 @@
         </p:nvSpPr>
         <p:spPr>
           <a:xfrm>
-            <a:off x="1119865" y="1727200"/>
+            <a:off x="1110326" y="1659840"/>
             <a:ext cx="7490735" cy="2997200"/>
           </a:xfrm>
           <a:prstGeom prst="roundRect">
@@ -3511,8 +3515,8 @@
         </p:nvSpPr>
         <p:spPr>
           <a:xfrm>
-            <a:off x="2877180" y="3158440"/>
-            <a:ext cx="1093635" cy="346760"/>
+            <a:off x="2888129" y="2987171"/>
+            <a:ext cx="1093635" cy="238889"/>
           </a:xfrm>
           <a:prstGeom prst="rect">
             <a:avLst/>
@@ -3786,15 +3790,16 @@
         <p:nvCxnSpPr>
           <p:cNvPr id="58" name="Straight Arrow Connector 57"/>
           <p:cNvCxnSpPr>
+            <a:cxnSpLocks/>
             <a:stCxn id="42" idx="3"/>
             <a:endCxn id="2" idx="1"/>
           </p:cNvCxnSpPr>
           <p:nvPr/>
         </p:nvCxnSpPr>
         <p:spPr>
-          <a:xfrm>
-            <a:off x="2656370" y="3326536"/>
-            <a:ext cx="220810" cy="5284"/>
+          <a:xfrm flipV="1">
+            <a:off x="2634342" y="3106616"/>
+            <a:ext cx="253787" cy="11520"/>
           </a:xfrm>
           <a:prstGeom prst="straightConnector1">
             <a:avLst/>
@@ -3915,7 +3920,7 @@
         </p:nvSpPr>
         <p:spPr>
           <a:xfrm>
-            <a:off x="2420322" y="3239846"/>
+            <a:off x="2398294" y="3031446"/>
             <a:ext cx="236048" cy="173380"/>
           </a:xfrm>
           <a:prstGeom prst="flowChartDecision">
@@ -3960,8 +3965,8 @@
         </p:nvSpPr>
         <p:spPr>
           <a:xfrm>
-            <a:off x="2879490" y="2627420"/>
-            <a:ext cx="1093635" cy="346760"/>
+            <a:off x="2894728" y="2648406"/>
+            <a:ext cx="1089574" cy="232473"/>
           </a:xfrm>
           <a:prstGeom prst="rect">
             <a:avLst/>
@@ -4012,15 +4017,16 @@
         <p:nvCxnSpPr>
           <p:cNvPr id="47" name="Straight Arrow Connector 46"/>
           <p:cNvCxnSpPr>
+            <a:cxnSpLocks/>
             <a:stCxn id="48" idx="3"/>
             <a:endCxn id="46" idx="1"/>
           </p:cNvCxnSpPr>
           <p:nvPr/>
         </p:nvCxnSpPr>
         <p:spPr>
-          <a:xfrm>
-            <a:off x="2658680" y="2795516"/>
-            <a:ext cx="220810" cy="5284"/>
+          <a:xfrm flipV="1">
+            <a:off x="2620982" y="2764643"/>
+            <a:ext cx="273746" cy="2171"/>
           </a:xfrm>
           <a:prstGeom prst="straightConnector1">
             <a:avLst/>
@@ -4057,8 +4063,8 @@
         </p:nvSpPr>
         <p:spPr>
           <a:xfrm>
-            <a:off x="2422632" y="2708826"/>
-            <a:ext cx="236048" cy="173380"/>
+            <a:off x="2384934" y="2678261"/>
+            <a:ext cx="236048" cy="177106"/>
           </a:xfrm>
           <a:prstGeom prst="flowChartDecision">
             <a:avLst/>
@@ -5662,7 +5668,7 @@
         </p:nvSpPr>
         <p:spPr>
           <a:xfrm>
-            <a:off x="2656370" y="3386050"/>
+            <a:off x="2666600" y="3153929"/>
             <a:ext cx="189257" cy="178683"/>
           </a:xfrm>
           <a:prstGeom prst="rect">
@@ -6576,6 +6582,214 @@
           <a:p>
             <a:pPr algn="ctr"/>
             <a:endParaRPr lang="en-US" sz="1050"/>
+          </a:p>
+        </p:txBody>
+      </p:sp>
+      <p:sp>
+        <p:nvSpPr>
+          <p:cNvPr id="98" name="Rectangle 8">
+            <a:extLst>
+              <a:ext uri="{FF2B5EF4-FFF2-40B4-BE49-F238E27FC236}">
+                <a16:creationId xmlns:a16="http://schemas.microsoft.com/office/drawing/2014/main" id="{5EC8C5A3-C0A7-41E8-87A3-93B9BFEC1257}"/>
+              </a:ext>
+            </a:extLst>
+          </p:cNvPr>
+          <p:cNvSpPr/>
+          <p:nvPr/>
+        </p:nvSpPr>
+        <p:spPr>
+          <a:xfrm>
+            <a:off x="2885304" y="3355364"/>
+            <a:ext cx="1093635" cy="238889"/>
+          </a:xfrm>
+          <a:prstGeom prst="rect">
+            <a:avLst/>
+          </a:prstGeom>
+          <a:solidFill>
+            <a:srgbClr val="7030A0"/>
+          </a:solidFill>
+          <a:ln w="19050">
+            <a:solidFill>
+              <a:srgbClr val="7030A0"/>
+            </a:solidFill>
+          </a:ln>
+          <a:effectLst/>
+        </p:spPr>
+        <p:style>
+          <a:lnRef idx="1">
+            <a:schemeClr val="accent2"/>
+          </a:lnRef>
+          <a:fillRef idx="2">
+            <a:schemeClr val="accent2"/>
+          </a:fillRef>
+          <a:effectRef idx="1">
+            <a:schemeClr val="accent2"/>
+          </a:effectRef>
+          <a:fontRef idx="minor">
+            <a:schemeClr val="dk1"/>
+          </a:fontRef>
+        </p:style>
+        <p:txBody>
+          <a:bodyPr rtlCol="0" anchor="ctr"/>
+          <a:lstStyle/>
+          <a:p>
+            <a:pPr algn="ctr"/>
+            <a:r>
+              <a:rPr lang="en-US" sz="1050" dirty="0">
+                <a:solidFill>
+                  <a:schemeClr val="bg1"/>
+                </a:solidFill>
+              </a:rPr>
+              <a:t>Password</a:t>
+            </a:r>
+            <a:endParaRPr lang="en-SG" sz="1050" dirty="0">
+              <a:solidFill>
+                <a:schemeClr val="bg1"/>
+              </a:solidFill>
+            </a:endParaRPr>
+          </a:p>
+        </p:txBody>
+      </p:sp>
+      <p:cxnSp>
+        <p:nvCxnSpPr>
+          <p:cNvPr id="102" name="Straight Arrow Connector 101">
+            <a:extLst>
+              <a:ext uri="{FF2B5EF4-FFF2-40B4-BE49-F238E27FC236}">
+                <a16:creationId xmlns:a16="http://schemas.microsoft.com/office/drawing/2014/main" id="{0A979481-6AD4-4033-AC30-3E212A04D273}"/>
+              </a:ext>
+            </a:extLst>
+          </p:cNvPr>
+          <p:cNvCxnSpPr>
+            <a:cxnSpLocks/>
+            <a:stCxn id="103" idx="3"/>
+          </p:cNvCxnSpPr>
+          <p:nvPr/>
+        </p:nvCxnSpPr>
+        <p:spPr>
+          <a:xfrm flipV="1">
+            <a:off x="2629457" y="3453386"/>
+            <a:ext cx="258672" cy="4552"/>
+          </a:xfrm>
+          <a:prstGeom prst="straightConnector1">
+            <a:avLst/>
+          </a:prstGeom>
+          <a:ln w="19050">
+            <a:solidFill>
+              <a:srgbClr val="7030A0"/>
+            </a:solidFill>
+            <a:headEnd type="none" w="med" len="med"/>
+            <a:tailEnd type="arrow" w="med" len="med"/>
+          </a:ln>
+          <a:effectLst/>
+        </p:spPr>
+        <p:style>
+          <a:lnRef idx="1">
+            <a:schemeClr val="accent2"/>
+          </a:lnRef>
+          <a:fillRef idx="2">
+            <a:schemeClr val="accent2"/>
+          </a:fillRef>
+          <a:effectRef idx="1">
+            <a:schemeClr val="accent2"/>
+          </a:effectRef>
+          <a:fontRef idx="minor">
+            <a:schemeClr val="dk1"/>
+          </a:fontRef>
+        </p:style>
+      </p:cxnSp>
+      <p:sp>
+        <p:nvSpPr>
+          <p:cNvPr id="103" name="Flowchart: Decision 96">
+            <a:extLst>
+              <a:ext uri="{FF2B5EF4-FFF2-40B4-BE49-F238E27FC236}">
+                <a16:creationId xmlns:a16="http://schemas.microsoft.com/office/drawing/2014/main" id="{26426127-BEF1-4313-B5D1-B3208DA3C4C7}"/>
+              </a:ext>
+            </a:extLst>
+          </p:cNvPr>
+          <p:cNvSpPr/>
+          <p:nvPr/>
+        </p:nvSpPr>
+        <p:spPr>
+          <a:xfrm>
+            <a:off x="2393409" y="3371248"/>
+            <a:ext cx="236048" cy="173380"/>
+          </a:xfrm>
+          <a:prstGeom prst="flowChartDecision">
+            <a:avLst/>
+          </a:prstGeom>
+          <a:noFill/>
+          <a:ln w="19050">
+            <a:solidFill>
+              <a:srgbClr val="7030A0"/>
+            </a:solidFill>
+          </a:ln>
+          <a:effectLst/>
+        </p:spPr>
+        <p:style>
+          <a:lnRef idx="1">
+            <a:schemeClr val="accent6"/>
+          </a:lnRef>
+          <a:fillRef idx="2">
+            <a:schemeClr val="accent6"/>
+          </a:fillRef>
+          <a:effectRef idx="1">
+            <a:schemeClr val="accent6"/>
+          </a:effectRef>
+          <a:fontRef idx="minor">
+            <a:schemeClr val="dk1"/>
+          </a:fontRef>
+        </p:style>
+        <p:txBody>
+          <a:bodyPr rtlCol="0" anchor="ctr"/>
+          <a:lstStyle/>
+          <a:p>
+            <a:pPr algn="ctr"/>
+            <a:endParaRPr lang="en-US" sz="1050"/>
+          </a:p>
+        </p:txBody>
+      </p:sp>
+      <p:sp>
+        <p:nvSpPr>
+          <p:cNvPr id="104" name="TextBox 103">
+            <a:extLst>
+              <a:ext uri="{FF2B5EF4-FFF2-40B4-BE49-F238E27FC236}">
+                <a16:creationId xmlns:a16="http://schemas.microsoft.com/office/drawing/2014/main" id="{E56B2272-13C7-4C3E-815D-A41478F4B80F}"/>
+              </a:ext>
+            </a:extLst>
+          </p:cNvPr>
+          <p:cNvSpPr txBox="1"/>
+          <p:nvPr/>
+        </p:nvSpPr>
+        <p:spPr>
+          <a:xfrm>
+            <a:off x="2661762" y="3479174"/>
+            <a:ext cx="189257" cy="178683"/>
+          </a:xfrm>
+          <a:prstGeom prst="rect">
+            <a:avLst/>
+          </a:prstGeom>
+          <a:noFill/>
+        </p:spPr>
+        <p:txBody>
+          <a:bodyPr wrap="square" lIns="0" tIns="0" rIns="0" bIns="0" rtlCol="0">
+            <a:noAutofit/>
+          </a:bodyPr>
+          <a:lstStyle/>
+          <a:p>
+            <a:pPr algn="ctr"/>
+            <a:r>
+              <a:rPr lang="en-US" sz="1100" dirty="0">
+                <a:solidFill>
+                  <a:srgbClr val="7030A0"/>
+                </a:solidFill>
+              </a:rPr>
+              <a:t>1</a:t>
+            </a:r>
+            <a:endParaRPr lang="en-SG" sz="1100" dirty="0">
+              <a:solidFill>
+                <a:srgbClr val="7030A0"/>
+              </a:solidFill>
+            </a:endParaRPr>
           </a:p>
         </p:txBody>
       </p:sp>

</xml_diff>